<commit_message>
working on poster, added economic analysis (IQR)
</commit_message>
<xml_diff>
--- a/Final Poster/diversity poster.pptx
+++ b/Final Poster/diversity poster.pptx
@@ -193,7 +193,7 @@
             <a:fld id="{33456894-2714-4AE7-9AD4-576C5E12D5F7}" type="datetimeFigureOut">
               <a:rPr lang="en-US" smtClean="0"/>
               <a:pPr/>
-              <a:t>11/26/2016</a:t>
+              <a:t>11/28/2016</a:t>
             </a:fld>
             <a:endParaRPr lang="en-US"/>
           </a:p>
@@ -723,7 +723,7 @@
             <a:fld id="{44B7EFBE-001D-4618-B40D-A5F9B7D86AF5}" type="datetimeFigureOut">
               <a:rPr lang="en-US" smtClean="0"/>
               <a:pPr/>
-              <a:t>11/26/2016</a:t>
+              <a:t>11/28/2016</a:t>
             </a:fld>
             <a:endParaRPr lang="en-US"/>
           </a:p>
@@ -890,7 +890,7 @@
             <a:fld id="{44B7EFBE-001D-4618-B40D-A5F9B7D86AF5}" type="datetimeFigureOut">
               <a:rPr lang="en-US" smtClean="0"/>
               <a:pPr/>
-              <a:t>11/26/2016</a:t>
+              <a:t>11/28/2016</a:t>
             </a:fld>
             <a:endParaRPr lang="en-US"/>
           </a:p>
@@ -1067,7 +1067,7 @@
             <a:fld id="{44B7EFBE-001D-4618-B40D-A5F9B7D86AF5}" type="datetimeFigureOut">
               <a:rPr lang="en-US" smtClean="0"/>
               <a:pPr/>
-              <a:t>11/26/2016</a:t>
+              <a:t>11/28/2016</a:t>
             </a:fld>
             <a:endParaRPr lang="en-US"/>
           </a:p>
@@ -1234,7 +1234,7 @@
             <a:fld id="{44B7EFBE-001D-4618-B40D-A5F9B7D86AF5}" type="datetimeFigureOut">
               <a:rPr lang="en-US" smtClean="0"/>
               <a:pPr/>
-              <a:t>11/26/2016</a:t>
+              <a:t>11/28/2016</a:t>
             </a:fld>
             <a:endParaRPr lang="en-US"/>
           </a:p>
@@ -1477,7 +1477,7 @@
             <a:fld id="{44B7EFBE-001D-4618-B40D-A5F9B7D86AF5}" type="datetimeFigureOut">
               <a:rPr lang="en-US" smtClean="0"/>
               <a:pPr/>
-              <a:t>11/26/2016</a:t>
+              <a:t>11/28/2016</a:t>
             </a:fld>
             <a:endParaRPr lang="en-US"/>
           </a:p>
@@ -1762,7 +1762,7 @@
             <a:fld id="{44B7EFBE-001D-4618-B40D-A5F9B7D86AF5}" type="datetimeFigureOut">
               <a:rPr lang="en-US" smtClean="0"/>
               <a:pPr/>
-              <a:t>11/26/2016</a:t>
+              <a:t>11/28/2016</a:t>
             </a:fld>
             <a:endParaRPr lang="en-US"/>
           </a:p>
@@ -2186,7 +2186,7 @@
             <a:fld id="{44B7EFBE-001D-4618-B40D-A5F9B7D86AF5}" type="datetimeFigureOut">
               <a:rPr lang="en-US" smtClean="0"/>
               <a:pPr/>
-              <a:t>11/26/2016</a:t>
+              <a:t>11/28/2016</a:t>
             </a:fld>
             <a:endParaRPr lang="en-US"/>
           </a:p>
@@ -2301,7 +2301,7 @@
             <a:fld id="{44B7EFBE-001D-4618-B40D-A5F9B7D86AF5}" type="datetimeFigureOut">
               <a:rPr lang="en-US" smtClean="0"/>
               <a:pPr/>
-              <a:t>11/26/2016</a:t>
+              <a:t>11/28/2016</a:t>
             </a:fld>
             <a:endParaRPr lang="en-US"/>
           </a:p>
@@ -2393,7 +2393,7 @@
             <a:fld id="{44B7EFBE-001D-4618-B40D-A5F9B7D86AF5}" type="datetimeFigureOut">
               <a:rPr lang="en-US" smtClean="0"/>
               <a:pPr/>
-              <a:t>11/26/2016</a:t>
+              <a:t>11/28/2016</a:t>
             </a:fld>
             <a:endParaRPr lang="en-US"/>
           </a:p>
@@ -2667,7 +2667,7 @@
             <a:fld id="{44B7EFBE-001D-4618-B40D-A5F9B7D86AF5}" type="datetimeFigureOut">
               <a:rPr lang="en-US" smtClean="0"/>
               <a:pPr/>
-              <a:t>11/26/2016</a:t>
+              <a:t>11/28/2016</a:t>
             </a:fld>
             <a:endParaRPr lang="en-US"/>
           </a:p>
@@ -2917,7 +2917,7 @@
             <a:fld id="{44B7EFBE-001D-4618-B40D-A5F9B7D86AF5}" type="datetimeFigureOut">
               <a:rPr lang="en-US" smtClean="0"/>
               <a:pPr/>
-              <a:t>11/26/2016</a:t>
+              <a:t>11/28/2016</a:t>
             </a:fld>
             <a:endParaRPr lang="en-US"/>
           </a:p>
@@ -3142,7 +3142,7 @@
             <a:fld id="{44B7EFBE-001D-4618-B40D-A5F9B7D86AF5}" type="datetimeFigureOut">
               <a:rPr lang="en-US" smtClean="0"/>
               <a:pPr/>
-              <a:t>11/26/2016</a:t>
+              <a:t>11/28/2016</a:t>
             </a:fld>
             <a:endParaRPr lang="en-US"/>
           </a:p>
@@ -3521,8 +3521,8 @@
         </p:nvSpPr>
         <p:spPr>
           <a:xfrm>
-            <a:off x="14935200" y="6654800"/>
-            <a:ext cx="14478000" cy="9510296"/>
+            <a:off x="14935200" y="6629400"/>
+            <a:ext cx="14478000" cy="9756517"/>
           </a:xfrm>
           <a:prstGeom prst="rect">
             <a:avLst/>
@@ -3579,6 +3579,13 @@
           <a:p>
             <a:pPr algn="ctr"/>
             <a:endParaRPr lang="en-US" dirty="0" smtClean="0">
+              <a:latin typeface="Arial" pitchFamily="34" charset="0"/>
+              <a:cs typeface="Arial" pitchFamily="34" charset="0"/>
+            </a:endParaRPr>
+          </a:p>
+          <a:p>
+            <a:pPr algn="ctr"/>
+            <a:endParaRPr lang="en-US" sz="1600" dirty="0" smtClean="0">
               <a:latin typeface="Arial" pitchFamily="34" charset="0"/>
               <a:cs typeface="Arial" pitchFamily="34" charset="0"/>
             </a:endParaRPr>
@@ -3721,7 +3728,7 @@
                   <a:latin typeface="Arial" pitchFamily="34" charset="0"/>
                   <a:cs typeface="Arial" pitchFamily="34" charset="0"/>
                 </a:rPr>
-                <a:t>Effects on County-Level Diversity on Educational, Economic,</a:t>
+                <a:t>Effects of County-Level Diversity on Educational, Economic,</a:t>
               </a:r>
             </a:p>
             <a:p>
@@ -3737,15 +3744,6 @@
                 </a:rPr>
                 <a:t>And Health-Related Outcomes</a:t>
               </a:r>
-              <a:endParaRPr lang="en-US" sz="8000" b="1" dirty="0" smtClean="0">
-                <a:solidFill>
-                  <a:schemeClr val="bg1">
-                    <a:lumMod val="85000"/>
-                  </a:schemeClr>
-                </a:solidFill>
-                <a:latin typeface="Arial" pitchFamily="34" charset="0"/>
-                <a:cs typeface="Arial" pitchFamily="34" charset="0"/>
-              </a:endParaRPr>
             </a:p>
           </p:txBody>
         </p:sp>
@@ -3875,65 +3873,8 @@
                   <a:latin typeface="Arial" pitchFamily="34" charset="0"/>
                   <a:cs typeface="Arial" pitchFamily="34" charset="0"/>
                 </a:rPr>
-                <a:t>Department </a:t>
+                <a:t>Department of Statistics, Rice University,</a:t>
               </a:r>
-              <a:r>
-                <a:rPr lang="en-US" sz="4400" i="1" dirty="0" smtClean="0">
-                  <a:solidFill>
-                    <a:schemeClr val="bg1">
-                      <a:lumMod val="85000"/>
-                    </a:schemeClr>
-                  </a:solidFill>
-                  <a:latin typeface="Arial" pitchFamily="34" charset="0"/>
-                  <a:cs typeface="Arial" pitchFamily="34" charset="0"/>
-                </a:rPr>
-                <a:t>of </a:t>
-              </a:r>
-              <a:r>
-                <a:rPr lang="en-US" sz="4400" i="1" dirty="0" smtClean="0">
-                  <a:solidFill>
-                    <a:schemeClr val="bg1">
-                      <a:lumMod val="85000"/>
-                    </a:schemeClr>
-                  </a:solidFill>
-                  <a:latin typeface="Arial" pitchFamily="34" charset="0"/>
-                  <a:cs typeface="Arial" pitchFamily="34" charset="0"/>
-                </a:rPr>
-                <a:t>Statistics, Rice </a:t>
-              </a:r>
-              <a:r>
-                <a:rPr lang="en-US" sz="4400" i="1" dirty="0" smtClean="0">
-                  <a:solidFill>
-                    <a:schemeClr val="bg1">
-                      <a:lumMod val="85000"/>
-                    </a:schemeClr>
-                  </a:solidFill>
-                  <a:latin typeface="Arial" pitchFamily="34" charset="0"/>
-                  <a:cs typeface="Arial" pitchFamily="34" charset="0"/>
-                </a:rPr>
-                <a:t>University</a:t>
-              </a:r>
-              <a:r>
-                <a:rPr lang="en-US" sz="4400" i="1" dirty="0" smtClean="0">
-                  <a:solidFill>
-                    <a:schemeClr val="bg1">
-                      <a:lumMod val="85000"/>
-                    </a:schemeClr>
-                  </a:solidFill>
-                  <a:latin typeface="Arial" pitchFamily="34" charset="0"/>
-                  <a:cs typeface="Arial" pitchFamily="34" charset="0"/>
-                </a:rPr>
-                <a:t>,</a:t>
-              </a:r>
-              <a:endParaRPr lang="en-US" sz="4400" i="1" dirty="0" smtClean="0">
-                <a:solidFill>
-                  <a:schemeClr val="bg1">
-                    <a:lumMod val="85000"/>
-                  </a:schemeClr>
-                </a:solidFill>
-                <a:latin typeface="Arial" pitchFamily="34" charset="0"/>
-                <a:cs typeface="Arial" pitchFamily="34" charset="0"/>
-              </a:endParaRPr>
             </a:p>
           </p:txBody>
         </p:sp>
@@ -4042,10 +3983,6 @@
                 </a:rPr>
                 <a:t>Links to all of our great data, IPUMS, etc.</a:t>
               </a:r>
-              <a:endParaRPr lang="en-US" sz="2000" dirty="0" smtClean="0">
-                <a:latin typeface="Arial" pitchFamily="34" charset="0"/>
-                <a:cs typeface="Arial" pitchFamily="34" charset="0"/>
-              </a:endParaRPr>
             </a:p>
           </p:txBody>
         </p:sp>
@@ -4255,7 +4192,7 @@
           <p:spPr>
             <a:xfrm>
               <a:off x="29853466" y="27981293"/>
-              <a:ext cx="13487400" cy="1015663"/>
+              <a:ext cx="13487400" cy="400110"/>
             </a:xfrm>
             <a:prstGeom prst="rect">
               <a:avLst/>
@@ -4269,11 +4206,11 @@
             <a:lstStyle/>
             <a:p>
               <a:r>
-                <a:rPr lang="en-US" sz="2000" dirty="0" smtClean="0">
+                <a:rPr lang="en-US" sz="2000" dirty="0" err="1" smtClean="0">
                   <a:latin typeface="Arial" pitchFamily="34" charset="0"/>
                   <a:cs typeface="Arial" pitchFamily="34" charset="0"/>
                 </a:rPr>
-                <a:t>This work would not be possible without the help and guidance of John Sexton (who provided the orthogonal sgRNA-promoter library and data analysis tools), Sebastian Castillo-Hair (dCas9 expression plasmid and modeling help), and Evan Olson. </a:t>
+                <a:t>Thi</a:t>
               </a:r>
               <a:endParaRPr lang="en-US" sz="2000" dirty="0">
                 <a:latin typeface="Arial" pitchFamily="34" charset="0"/>
@@ -4283,66 +4220,6 @@
           </p:txBody>
         </p:sp>
       </p:grpSp>
-      <p:sp>
-        <p:nvSpPr>
-          <p:cNvPr id="2054" name="AutoShape 6" descr="Displaying RiceLogo hi res white type med size.png"/>
-          <p:cNvSpPr>
-            <a:spLocks noChangeAspect="1" noChangeArrowheads="1"/>
-          </p:cNvSpPr>
-          <p:nvPr/>
-        </p:nvSpPr>
-        <p:spPr bwMode="auto">
-          <a:xfrm>
-            <a:off x="155575" y="-144463"/>
-            <a:ext cx="304800" cy="304801"/>
-          </a:xfrm>
-          <a:prstGeom prst="rect">
-            <a:avLst/>
-          </a:prstGeom>
-          <a:noFill/>
-        </p:spPr>
-        <p:txBody>
-          <a:bodyPr vert="horz" wrap="square" lIns="91440" tIns="45720" rIns="91440" bIns="45720" numCol="1" anchor="t" anchorCtr="0" compatLnSpc="1">
-            <a:prstTxWarp prst="textNoShape">
-              <a:avLst/>
-            </a:prstTxWarp>
-          </a:bodyPr>
-          <a:lstStyle/>
-          <a:p>
-            <a:endParaRPr lang="en-US"/>
-          </a:p>
-        </p:txBody>
-      </p:sp>
-      <p:sp>
-        <p:nvSpPr>
-          <p:cNvPr id="2056" name="AutoShape 8" descr="Displaying RiceLogo hi res white type med size.png"/>
-          <p:cNvSpPr>
-            <a:spLocks noChangeAspect="1" noChangeArrowheads="1"/>
-          </p:cNvSpPr>
-          <p:nvPr/>
-        </p:nvSpPr>
-        <p:spPr bwMode="auto">
-          <a:xfrm>
-            <a:off x="155575" y="-144463"/>
-            <a:ext cx="304800" cy="304801"/>
-          </a:xfrm>
-          <a:prstGeom prst="rect">
-            <a:avLst/>
-          </a:prstGeom>
-          <a:noFill/>
-        </p:spPr>
-        <p:txBody>
-          <a:bodyPr vert="horz" wrap="square" lIns="91440" tIns="45720" rIns="91440" bIns="45720" numCol="1" anchor="t" anchorCtr="0" compatLnSpc="1">
-            <a:prstTxWarp prst="textNoShape">
-              <a:avLst/>
-            </a:prstTxWarp>
-          </a:bodyPr>
-          <a:lstStyle/>
-          <a:p>
-            <a:endParaRPr lang="en-US"/>
-          </a:p>
-        </p:txBody>
-      </p:sp>
       <p:pic>
         <p:nvPicPr>
           <p:cNvPr id="2057" name="Picture 9" descr="C:\Users\Kenny\Downloads\RiceLogo hi res white type med size.png"/>
@@ -4378,9 +4255,9 @@
         <p:grpSpPr>
           <a:xfrm>
             <a:off x="76200" y="5638802"/>
-            <a:ext cx="14630402" cy="11670447"/>
+            <a:ext cx="14630402" cy="9023568"/>
             <a:chOff x="76200" y="5638802"/>
-            <a:chExt cx="14630402" cy="11670447"/>
+            <a:chExt cx="14630402" cy="9023568"/>
           </a:xfrm>
         </p:grpSpPr>
         <p:grpSp>
@@ -4392,9 +4269,9 @@
           <p:grpSpPr>
             <a:xfrm>
               <a:off x="228601" y="5638802"/>
-              <a:ext cx="14478001" cy="11670447"/>
+              <a:ext cx="14478001" cy="9023568"/>
               <a:chOff x="434871" y="7426391"/>
-              <a:chExt cx="9797821" cy="10205212"/>
+              <a:chExt cx="9797821" cy="7890651"/>
             </a:xfrm>
           </p:grpSpPr>
           <p:sp>
@@ -4406,7 +4283,7 @@
             <p:spPr>
               <a:xfrm>
                 <a:off x="434871" y="8292620"/>
-                <a:ext cx="9797821" cy="9338983"/>
+                <a:ext cx="9797821" cy="7024422"/>
               </a:xfrm>
               <a:prstGeom prst="rect">
                 <a:avLst/>
@@ -4425,20 +4302,6 @@
                 <a:spAutoFit/>
               </a:bodyPr>
               <a:lstStyle/>
-              <a:p>
-                <a:pPr algn="ctr"/>
-                <a:endParaRPr lang="en-US" dirty="0" smtClean="0">
-                  <a:latin typeface="Arial" pitchFamily="34" charset="0"/>
-                  <a:cs typeface="Arial" pitchFamily="34" charset="0"/>
-                </a:endParaRPr>
-              </a:p>
-              <a:p>
-                <a:pPr algn="ctr"/>
-                <a:endParaRPr lang="en-US" dirty="0" smtClean="0">
-                  <a:latin typeface="Arial" pitchFamily="34" charset="0"/>
-                  <a:cs typeface="Arial" pitchFamily="34" charset="0"/>
-                </a:endParaRPr>
-              </a:p>
               <a:p>
                 <a:pPr algn="ctr"/>
                 <a:endParaRPr lang="en-US" dirty="0" smtClean="0">
@@ -4520,7 +4383,7 @@
                     <a:latin typeface="Arial" pitchFamily="34" charset="0"/>
                     <a:cs typeface="Arial" pitchFamily="34" charset="0"/>
                   </a:rPr>
-                  <a:t>Motivation</a:t>
+                  <a:t>Introduction</a:t>
                 </a:r>
                 <a:endParaRPr lang="en-US" sz="6000" dirty="0">
                   <a:latin typeface="Arial" pitchFamily="34" charset="0"/>
@@ -4539,7 +4402,7 @@
           <p:spPr>
             <a:xfrm>
               <a:off x="76200" y="6845712"/>
-              <a:ext cx="14325600" cy="1990288"/>
+              <a:ext cx="14325600" cy="5311711"/>
             </a:xfrm>
             <a:prstGeom prst="rect">
               <a:avLst/>
@@ -4551,6 +4414,24 @@
               <a:spAutoFit/>
             </a:bodyPr>
             <a:lstStyle/>
+            <a:p>
+              <a:pPr marL="863600" lvl="1" indent="-406400">
+                <a:lnSpc>
+                  <a:spcPts val="3700"/>
+                </a:lnSpc>
+              </a:pPr>
+              <a:r>
+                <a:rPr lang="en-US" sz="3200" b="1" dirty="0" smtClean="0">
+                  <a:latin typeface="Arial" pitchFamily="34" charset="0"/>
+                  <a:cs typeface="Arial" pitchFamily="34" charset="0"/>
+                </a:rPr>
+                <a:t>Motivation:</a:t>
+              </a:r>
+              <a:endParaRPr lang="en-US" sz="3200" b="1" dirty="0" smtClean="0">
+                <a:latin typeface="Arial" pitchFamily="34" charset="0"/>
+                <a:cs typeface="Arial" pitchFamily="34" charset="0"/>
+              </a:endParaRPr>
+            </a:p>
             <a:p>
               <a:pPr marL="863600" lvl="1" indent="-406400">
                 <a:lnSpc>
@@ -4564,31 +4445,22 @@
                   <a:latin typeface="Arial" pitchFamily="34" charset="0"/>
                   <a:cs typeface="Arial" pitchFamily="34" charset="0"/>
                 </a:rPr>
-                <a:t>Blah </a:t>
-              </a:r>
-              <a:r>
-                <a:rPr lang="en-US" sz="3200" dirty="0" err="1" smtClean="0">
-                  <a:latin typeface="Arial" pitchFamily="34" charset="0"/>
-                  <a:cs typeface="Arial" pitchFamily="34" charset="0"/>
-                </a:rPr>
-                <a:t>Blah</a:t>
+                <a:t>In </a:t>
               </a:r>
               <a:r>
                 <a:rPr lang="en-US" sz="3200" dirty="0" smtClean="0">
                   <a:latin typeface="Arial" pitchFamily="34" charset="0"/>
                   <a:cs typeface="Arial" pitchFamily="34" charset="0"/>
                 </a:rPr>
-                <a:t> diversity is important</a:t>
+                <a:t>today’s society, it is common to hear the government, businesses, and members of our community touting the benefits of diversity [1</a:t>
               </a:r>
-            </a:p>
-            <a:p>
-              <a:pPr marL="863600" lvl="1" indent="-406400">
-                <a:lnSpc>
-                  <a:spcPts val="3700"/>
-                </a:lnSpc>
-                <a:buFont typeface="Arial" pitchFamily="34" charset="0"/>
-                <a:buChar char="•"/>
-              </a:pPr>
+              <a:r>
+                <a:rPr lang="en-US" sz="3200" dirty="0" smtClean="0">
+                  <a:latin typeface="Arial" pitchFamily="34" charset="0"/>
+                  <a:cs typeface="Arial" pitchFamily="34" charset="0"/>
+                </a:rPr>
+                <a:t>]</a:t>
+              </a:r>
               <a:endParaRPr lang="en-US" sz="3200" dirty="0" smtClean="0">
                 <a:latin typeface="Arial" pitchFamily="34" charset="0"/>
                 <a:cs typeface="Arial" pitchFamily="34" charset="0"/>
@@ -4607,22 +4479,101 @@
                   <a:latin typeface="Arial" pitchFamily="34" charset="0"/>
                   <a:cs typeface="Arial" pitchFamily="34" charset="0"/>
                 </a:rPr>
-                <a:t>Maybe we can find some research articles that indicate this and </a:t>
-              </a:r>
-              <a:r>
-                <a:rPr lang="en-US" sz="3200" dirty="0" err="1" smtClean="0">
-                  <a:latin typeface="Arial" pitchFamily="34" charset="0"/>
-                  <a:cs typeface="Arial" pitchFamily="34" charset="0"/>
-                </a:rPr>
-                <a:t>inclide</a:t>
+                <a:t>Indeed, diversity provides micro-scale benefits in certain organizations (new perspectives, increased productivity, expanded worldview, etc</a:t>
               </a:r>
               <a:r>
                 <a:rPr lang="en-US" sz="3200" dirty="0" smtClean="0">
                   <a:latin typeface="Arial" pitchFamily="34" charset="0"/>
                   <a:cs typeface="Arial" pitchFamily="34" charset="0"/>
                 </a:rPr>
-                <a:t> a figure of smiling children</a:t>
+                <a:t>.) [2] </a:t>
               </a:r>
+              <a:endParaRPr lang="en-US" sz="3200" dirty="0" smtClean="0">
+                <a:latin typeface="Arial" pitchFamily="34" charset="0"/>
+                <a:cs typeface="Arial" pitchFamily="34" charset="0"/>
+              </a:endParaRPr>
+            </a:p>
+            <a:p>
+              <a:pPr marL="863600" lvl="1" indent="-406400">
+                <a:lnSpc>
+                  <a:spcPts val="3700"/>
+                </a:lnSpc>
+                <a:buFont typeface="Arial" pitchFamily="34" charset="0"/>
+                <a:buChar char="•"/>
+              </a:pPr>
+              <a:r>
+                <a:rPr lang="en-US" sz="3200" dirty="0" smtClean="0">
+                  <a:latin typeface="Arial" pitchFamily="34" charset="0"/>
+                  <a:cs typeface="Arial" pitchFamily="34" charset="0"/>
+                </a:rPr>
+                <a:t>We seek to </a:t>
+              </a:r>
+              <a:r>
+                <a:rPr lang="en-US" sz="3200" b="1" dirty="0" smtClean="0">
+                  <a:latin typeface="Arial" pitchFamily="34" charset="0"/>
+                  <a:cs typeface="Arial" pitchFamily="34" charset="0"/>
+                </a:rPr>
+                <a:t>examine</a:t>
+              </a:r>
+              <a:r>
+                <a:rPr lang="en-US" sz="3200" dirty="0" smtClean="0">
+                  <a:latin typeface="Arial" pitchFamily="34" charset="0"/>
+                  <a:cs typeface="Arial" pitchFamily="34" charset="0"/>
+                </a:rPr>
+                <a:t> </a:t>
+              </a:r>
+              <a:r>
+                <a:rPr lang="en-US" sz="3200" b="1" dirty="0" smtClean="0">
+                  <a:latin typeface="Arial" pitchFamily="34" charset="0"/>
+                  <a:cs typeface="Arial" pitchFamily="34" charset="0"/>
+                </a:rPr>
+                <a:t>macro-level effects of county-level diversity</a:t>
+              </a:r>
+              <a:r>
+                <a:rPr lang="en-US" sz="3200" dirty="0" smtClean="0">
+                  <a:latin typeface="Arial" pitchFamily="34" charset="0"/>
+                  <a:cs typeface="Arial" pitchFamily="34" charset="0"/>
+                </a:rPr>
+                <a:t> on a variety of downstream indicators of success: education, economics, and health</a:t>
+              </a:r>
+            </a:p>
+            <a:p>
+              <a:pPr marL="863600" lvl="1" indent="-406400">
+                <a:lnSpc>
+                  <a:spcPts val="3700"/>
+                </a:lnSpc>
+              </a:pPr>
+              <a:endParaRPr lang="en-US" sz="3200" dirty="0" smtClean="0">
+                <a:latin typeface="Arial" pitchFamily="34" charset="0"/>
+                <a:cs typeface="Arial" pitchFamily="34" charset="0"/>
+              </a:endParaRPr>
+            </a:p>
+            <a:p>
+              <a:pPr marL="863600" lvl="1" indent="-406400">
+                <a:lnSpc>
+                  <a:spcPts val="3700"/>
+                </a:lnSpc>
+              </a:pPr>
+              <a:r>
+                <a:rPr lang="en-US" sz="3200" b="1" dirty="0" smtClean="0">
+                  <a:latin typeface="Arial" pitchFamily="34" charset="0"/>
+                  <a:cs typeface="Arial" pitchFamily="34" charset="0"/>
+                </a:rPr>
+                <a:t>Workflow:</a:t>
+              </a:r>
+              <a:endParaRPr lang="en-US" sz="3200" b="1" dirty="0" smtClean="0">
+                <a:latin typeface="Arial" pitchFamily="34" charset="0"/>
+                <a:cs typeface="Arial" pitchFamily="34" charset="0"/>
+              </a:endParaRPr>
+            </a:p>
+            <a:p>
+              <a:pPr marL="863600" lvl="1" indent="-406400">
+                <a:lnSpc>
+                  <a:spcPts val="3700"/>
+                </a:lnSpc>
+                <a:buFont typeface="Arial" pitchFamily="34" charset="0"/>
+                <a:buChar char="•"/>
+              </a:pPr>
               <a:endParaRPr lang="en-US" sz="3200" dirty="0" smtClean="0">
                 <a:latin typeface="Arial" pitchFamily="34" charset="0"/>
                 <a:cs typeface="Arial" pitchFamily="34" charset="0"/>
@@ -4639,10 +4590,10 @@
         </p:nvGrpSpPr>
         <p:grpSpPr>
           <a:xfrm>
-            <a:off x="228599" y="18044101"/>
-            <a:ext cx="14478001" cy="14080749"/>
+            <a:off x="152400" y="14935200"/>
+            <a:ext cx="14478001" cy="17466291"/>
             <a:chOff x="434871" y="7026592"/>
-            <a:chExt cx="9797821" cy="12312882"/>
+            <a:chExt cx="9797821" cy="15273362"/>
           </a:xfrm>
         </p:grpSpPr>
         <p:sp>
@@ -4654,7 +4605,7 @@
           <p:spPr>
             <a:xfrm>
               <a:off x="434871" y="7874340"/>
-              <a:ext cx="9797821" cy="11465134"/>
+              <a:ext cx="9797821" cy="14425614"/>
             </a:xfrm>
             <a:prstGeom prst="rect">
               <a:avLst/>
@@ -4676,6 +4627,90 @@
             <a:p>
               <a:pPr algn="ctr"/>
               <a:endParaRPr lang="en-US" dirty="0" smtClean="0">
+                <a:latin typeface="Arial" pitchFamily="34" charset="0"/>
+                <a:cs typeface="Arial" pitchFamily="34" charset="0"/>
+              </a:endParaRPr>
+            </a:p>
+            <a:p>
+              <a:pPr algn="ctr"/>
+              <a:endParaRPr lang="en-US" sz="2000" dirty="0" smtClean="0">
+                <a:latin typeface="Arial" pitchFamily="34" charset="0"/>
+                <a:cs typeface="Arial" pitchFamily="34" charset="0"/>
+              </a:endParaRPr>
+            </a:p>
+            <a:p>
+              <a:pPr algn="ctr"/>
+              <a:endParaRPr lang="en-US" sz="2000" dirty="0" smtClean="0">
+                <a:latin typeface="Arial" pitchFamily="34" charset="0"/>
+                <a:cs typeface="Arial" pitchFamily="34" charset="0"/>
+              </a:endParaRPr>
+            </a:p>
+            <a:p>
+              <a:pPr algn="ctr"/>
+              <a:endParaRPr lang="en-US" sz="2000" dirty="0" smtClean="0">
+                <a:latin typeface="Arial" pitchFamily="34" charset="0"/>
+                <a:cs typeface="Arial" pitchFamily="34" charset="0"/>
+              </a:endParaRPr>
+            </a:p>
+            <a:p>
+              <a:pPr algn="ctr"/>
+              <a:endParaRPr lang="en-US" sz="2000" dirty="0" smtClean="0">
+                <a:latin typeface="Arial" pitchFamily="34" charset="0"/>
+                <a:cs typeface="Arial" pitchFamily="34" charset="0"/>
+              </a:endParaRPr>
+            </a:p>
+            <a:p>
+              <a:pPr algn="ctr"/>
+              <a:endParaRPr lang="en-US" sz="2000" dirty="0" smtClean="0">
+                <a:latin typeface="Arial" pitchFamily="34" charset="0"/>
+                <a:cs typeface="Arial" pitchFamily="34" charset="0"/>
+              </a:endParaRPr>
+            </a:p>
+            <a:p>
+              <a:pPr algn="ctr"/>
+              <a:endParaRPr lang="en-US" sz="2000" dirty="0" smtClean="0">
+                <a:latin typeface="Arial" pitchFamily="34" charset="0"/>
+                <a:cs typeface="Arial" pitchFamily="34" charset="0"/>
+              </a:endParaRPr>
+            </a:p>
+            <a:p>
+              <a:pPr algn="ctr"/>
+              <a:endParaRPr lang="en-US" sz="2000" dirty="0" smtClean="0">
+                <a:latin typeface="Arial" pitchFamily="34" charset="0"/>
+                <a:cs typeface="Arial" pitchFamily="34" charset="0"/>
+              </a:endParaRPr>
+            </a:p>
+            <a:p>
+              <a:pPr algn="ctr"/>
+              <a:endParaRPr lang="en-US" sz="2000" dirty="0" smtClean="0">
+                <a:latin typeface="Arial" pitchFamily="34" charset="0"/>
+                <a:cs typeface="Arial" pitchFamily="34" charset="0"/>
+              </a:endParaRPr>
+            </a:p>
+            <a:p>
+              <a:pPr algn="ctr"/>
+              <a:endParaRPr lang="en-US" sz="2000" dirty="0" smtClean="0">
+                <a:latin typeface="Arial" pitchFamily="34" charset="0"/>
+                <a:cs typeface="Arial" pitchFamily="34" charset="0"/>
+              </a:endParaRPr>
+            </a:p>
+            <a:p>
+              <a:pPr algn="ctr"/>
+              <a:endParaRPr lang="en-US" sz="2000" dirty="0" smtClean="0">
+                <a:latin typeface="Arial" pitchFamily="34" charset="0"/>
+                <a:cs typeface="Arial" pitchFamily="34" charset="0"/>
+              </a:endParaRPr>
+            </a:p>
+            <a:p>
+              <a:pPr algn="ctr"/>
+              <a:endParaRPr lang="en-US" sz="2000" dirty="0" smtClean="0">
+                <a:latin typeface="Arial" pitchFamily="34" charset="0"/>
+                <a:cs typeface="Arial" pitchFamily="34" charset="0"/>
+              </a:endParaRPr>
+            </a:p>
+            <a:p>
+              <a:pPr algn="ctr"/>
+              <a:endParaRPr lang="en-US" sz="2000" dirty="0" smtClean="0">
                 <a:latin typeface="Arial" pitchFamily="34" charset="0"/>
                 <a:cs typeface="Arial" pitchFamily="34" charset="0"/>
               </a:endParaRPr>
@@ -5414,8 +5449,8 @@
         </p:nvSpPr>
         <p:spPr>
           <a:xfrm>
-            <a:off x="76200" y="19263302"/>
-            <a:ext cx="14554200" cy="566822"/>
+            <a:off x="76200" y="16120978"/>
+            <a:ext cx="14401800" cy="15275977"/>
           </a:xfrm>
           <a:prstGeom prst="rect">
             <a:avLst/>
@@ -5427,6 +5462,20 @@
             <a:spAutoFit/>
           </a:bodyPr>
           <a:lstStyle/>
+          <a:p>
+            <a:pPr marL="863600" lvl="1" indent="-406400">
+              <a:lnSpc>
+                <a:spcPts val="3700"/>
+              </a:lnSpc>
+            </a:pPr>
+            <a:r>
+              <a:rPr lang="en-US" sz="3200" b="1" dirty="0" smtClean="0">
+                <a:latin typeface="Arial" pitchFamily="34" charset="0"/>
+                <a:cs typeface="Arial" pitchFamily="34" charset="0"/>
+              </a:rPr>
+              <a:t>Description of Methods:</a:t>
+            </a:r>
+          </a:p>
           <a:p>
             <a:pPr marL="863600" lvl="1" indent="-406400">
               <a:lnSpc>
@@ -5440,39 +5489,51 @@
                 <a:latin typeface="Arial" pitchFamily="34" charset="0"/>
                 <a:cs typeface="Arial" pitchFamily="34" charset="0"/>
               </a:rPr>
-              <a:t>Negative </a:t>
+              <a:t>Each county </a:t>
+            </a:r>
+            <a:r>
+              <a:rPr lang="en-US" sz="3200" i="1" dirty="0" smtClean="0">
+                <a:latin typeface="Arial" pitchFamily="34" charset="0"/>
+                <a:cs typeface="Arial" pitchFamily="34" charset="0"/>
+              </a:rPr>
+              <a:t>j</a:t>
             </a:r>
             <a:r>
               <a:rPr lang="en-US" sz="3200" dirty="0" smtClean="0">
                 <a:latin typeface="Arial" pitchFamily="34" charset="0"/>
                 <a:cs typeface="Arial" pitchFamily="34" charset="0"/>
               </a:rPr>
-              <a:t>autoregulation has several advantages over simple repression:</a:t>
-            </a:r>
-          </a:p>
-        </p:txBody>
-      </p:sp>
-      <p:sp>
-        <p:nvSpPr>
-          <p:cNvPr id="201" name="TextBox 200"/>
-          <p:cNvSpPr txBox="1"/>
-          <p:nvPr/>
-        </p:nvSpPr>
-        <p:spPr>
-          <a:xfrm>
-            <a:off x="14859000" y="6829489"/>
-            <a:ext cx="14325600" cy="5311711"/>
-          </a:xfrm>
-          <a:prstGeom prst="rect">
-            <a:avLst/>
-          </a:prstGeom>
-          <a:noFill/>
-        </p:spPr>
-        <p:txBody>
-          <a:bodyPr wrap="square" rtlCol="0">
-            <a:spAutoFit/>
-          </a:bodyPr>
-          <a:lstStyle/>
+              <a:t> is assigned a diversity index value </a:t>
+            </a:r>
+            <a:r>
+              <a:rPr lang="en-US" sz="3200" i="1" dirty="0" smtClean="0">
+                <a:latin typeface="Arial" pitchFamily="34" charset="0"/>
+                <a:cs typeface="Arial" pitchFamily="34" charset="0"/>
+              </a:rPr>
+              <a:t>d</a:t>
+            </a:r>
+            <a:r>
+              <a:rPr lang="en-US" sz="3200" i="1" baseline="-25000" dirty="0" smtClean="0">
+                <a:latin typeface="Arial" pitchFamily="34" charset="0"/>
+                <a:cs typeface="Arial" pitchFamily="34" charset="0"/>
+              </a:rPr>
+              <a:t>j</a:t>
+            </a:r>
+            <a:r>
+              <a:rPr lang="en-US" sz="3200" i="1" baseline="-25000" dirty="0" smtClean="0">
+                <a:latin typeface="Arial" pitchFamily="34" charset="0"/>
+                <a:cs typeface="Arial" pitchFamily="34" charset="0"/>
+              </a:rPr>
+              <a:t> </a:t>
+            </a:r>
+            <a:r>
+              <a:rPr lang="en-US" sz="3200" dirty="0" smtClean="0">
+                <a:latin typeface="Arial" pitchFamily="34" charset="0"/>
+                <a:cs typeface="Arial" pitchFamily="34" charset="0"/>
+              </a:rPr>
+              <a:t>based on the race breakdown of its population</a:t>
+            </a:r>
+          </a:p>
           <a:p>
             <a:pPr marL="863600" lvl="1" indent="-406400">
               <a:lnSpc>
@@ -5482,16 +5543,61 @@
               <a:buChar char="•"/>
             </a:pPr>
             <a:r>
-              <a:rPr lang="en-US" sz="3200" dirty="0" err="1" smtClean="0">
+              <a:rPr lang="en-US" sz="3200" dirty="0" smtClean="0">
                 <a:latin typeface="Arial" pitchFamily="34" charset="0"/>
                 <a:cs typeface="Arial" pitchFamily="34" charset="0"/>
               </a:rPr>
-              <a:t>Fmlkdfmslfs</a:t>
-            </a:r>
-            <a:endParaRPr lang="en-US" sz="3200" dirty="0" smtClean="0">
-              <a:latin typeface="Arial" pitchFamily="34" charset="0"/>
-              <a:cs typeface="Arial" pitchFamily="34" charset="0"/>
-            </a:endParaRPr>
+              <a:t>The diversity index is calculated according to the following formula, where </a:t>
+            </a:r>
+            <a:r>
+              <a:rPr lang="en-US" sz="3200" i="1" dirty="0" err="1" smtClean="0">
+                <a:latin typeface="Arial" pitchFamily="34" charset="0"/>
+                <a:cs typeface="Arial" pitchFamily="34" charset="0"/>
+              </a:rPr>
+              <a:t>x</a:t>
+            </a:r>
+            <a:r>
+              <a:rPr lang="en-US" sz="3200" i="1" baseline="-25000" dirty="0" err="1" smtClean="0">
+                <a:latin typeface="Arial" pitchFamily="34" charset="0"/>
+                <a:cs typeface="Arial" pitchFamily="34" charset="0"/>
+              </a:rPr>
+              <a:t>ij</a:t>
+            </a:r>
+            <a:r>
+              <a:rPr lang="en-US" sz="3200" dirty="0" smtClean="0">
+                <a:latin typeface="Arial" pitchFamily="34" charset="0"/>
+                <a:cs typeface="Arial" pitchFamily="34" charset="0"/>
+              </a:rPr>
+              <a:t> is the proportion of race </a:t>
+            </a:r>
+            <a:r>
+              <a:rPr lang="en-US" sz="3200" i="1" dirty="0" err="1" smtClean="0">
+                <a:latin typeface="Arial" pitchFamily="34" charset="0"/>
+                <a:cs typeface="Arial" pitchFamily="34" charset="0"/>
+              </a:rPr>
+              <a:t>i</a:t>
+            </a:r>
+            <a:r>
+              <a:rPr lang="en-US" sz="3200" dirty="0" smtClean="0">
+                <a:latin typeface="Arial" pitchFamily="34" charset="0"/>
+                <a:cs typeface="Arial" pitchFamily="34" charset="0"/>
+              </a:rPr>
+              <a:t> in county </a:t>
+            </a:r>
+            <a:r>
+              <a:rPr lang="en-US" sz="3200" i="1" dirty="0" smtClean="0">
+                <a:latin typeface="Arial" pitchFamily="34" charset="0"/>
+                <a:cs typeface="Arial" pitchFamily="34" charset="0"/>
+              </a:rPr>
+              <a:t>j</a:t>
+            </a:r>
+            <a:r>
+              <a:rPr lang="en-US" sz="3200" dirty="0" smtClean="0">
+                <a:latin typeface="Arial" pitchFamily="34" charset="0"/>
+                <a:cs typeface="Arial" pitchFamily="34" charset="0"/>
+              </a:rPr>
+              <a:t>:</a:t>
+            </a:r>
           </a:p>
           <a:p>
             <a:pPr marL="863600" lvl="1" indent="-406400">
@@ -5514,17 +5620,58 @@
               <a:buFont typeface="Arial" pitchFamily="34" charset="0"/>
               <a:buChar char="•"/>
             </a:pPr>
-            <a:r>
-              <a:rPr lang="en-US" sz="3200" dirty="0" err="1" smtClean="0">
+            <a:endParaRPr lang="en-US" sz="3200" dirty="0" smtClean="0">
+              <a:latin typeface="Arial" pitchFamily="34" charset="0"/>
+              <a:cs typeface="Arial" pitchFamily="34" charset="0"/>
+            </a:endParaRPr>
+          </a:p>
+          <a:p>
+            <a:pPr marL="863600" lvl="1" indent="-406400">
+              <a:lnSpc>
+                <a:spcPts val="3700"/>
+              </a:lnSpc>
+            </a:pPr>
+            <a:endParaRPr lang="en-US" sz="3200" dirty="0" smtClean="0">
+              <a:latin typeface="Arial" pitchFamily="34" charset="0"/>
+              <a:cs typeface="Arial" pitchFamily="34" charset="0"/>
+            </a:endParaRPr>
+          </a:p>
+          <a:p>
+            <a:pPr marL="863600" lvl="1" indent="-406400">
+              <a:lnSpc>
+                <a:spcPts val="3700"/>
+              </a:lnSpc>
+              <a:buFont typeface="Arial" pitchFamily="34" charset="0"/>
+              <a:buChar char="•"/>
+            </a:pPr>
+            <a:r>
+              <a:rPr lang="en-US" sz="3200" dirty="0" smtClean="0">
                 <a:latin typeface="Arial" pitchFamily="34" charset="0"/>
                 <a:cs typeface="Arial" pitchFamily="34" charset="0"/>
               </a:rPr>
-              <a:t>Ksnfdosmfls</a:t>
-            </a:r>
-            <a:endParaRPr lang="en-US" sz="3200" dirty="0" smtClean="0">
-              <a:latin typeface="Arial" pitchFamily="34" charset="0"/>
-              <a:cs typeface="Arial" pitchFamily="34" charset="0"/>
-            </a:endParaRPr>
+              <a:t>A county with the highest possible </a:t>
+            </a:r>
+            <a:r>
+              <a:rPr lang="en-US" sz="3200" i="1" dirty="0" smtClean="0">
+                <a:latin typeface="Arial" pitchFamily="34" charset="0"/>
+                <a:cs typeface="Arial" pitchFamily="34" charset="0"/>
+              </a:rPr>
+              <a:t>d</a:t>
+            </a:r>
+            <a:r>
+              <a:rPr lang="en-US" sz="3200" i="1" baseline="-25000" dirty="0" smtClean="0">
+                <a:latin typeface="Arial" pitchFamily="34" charset="0"/>
+                <a:cs typeface="Arial" pitchFamily="34" charset="0"/>
+              </a:rPr>
+              <a:t>j</a:t>
+            </a:r>
+            <a:r>
+              <a:rPr lang="en-US" sz="3200" dirty="0" smtClean="0">
+                <a:latin typeface="Arial" pitchFamily="34" charset="0"/>
+                <a:cs typeface="Arial" pitchFamily="34" charset="0"/>
+              </a:rPr>
+              <a:t> has its population spread exactly evenly across the 8 races, whereas the lowest possible score has its entire population as one of the groups (i.e. 100% white, 0% everything else)</a:t>
+            </a:r>
           </a:p>
           <a:p>
             <a:pPr marL="863600" lvl="1" indent="-406400">
@@ -5544,10 +5691,15 @@
               <a:lnSpc>
                 <a:spcPts val="3700"/>
               </a:lnSpc>
-              <a:buFont typeface="Arial" pitchFamily="34" charset="0"/>
-              <a:buChar char="•"/>
             </a:pPr>
-            <a:endParaRPr lang="en-US" sz="3200" dirty="0" smtClean="0">
+            <a:r>
+              <a:rPr lang="en-US" sz="3200" b="1" dirty="0" smtClean="0">
+                <a:latin typeface="Arial" pitchFamily="34" charset="0"/>
+                <a:cs typeface="Arial" pitchFamily="34" charset="0"/>
+              </a:rPr>
+              <a:t>Data:</a:t>
+            </a:r>
+            <a:endParaRPr lang="en-US" sz="3200" b="1" dirty="0" smtClean="0">
               <a:latin typeface="Arial" pitchFamily="34" charset="0"/>
               <a:cs typeface="Arial" pitchFamily="34" charset="0"/>
             </a:endParaRPr>
@@ -5561,16 +5713,26 @@
               <a:buChar char="•"/>
             </a:pPr>
             <a:r>
+              <a:rPr lang="en-US" sz="3200" dirty="0" smtClean="0">
+                <a:latin typeface="Arial" pitchFamily="34" charset="0"/>
+                <a:cs typeface="Arial" pitchFamily="34" charset="0"/>
+              </a:rPr>
+              <a:t>Data is pulled from IPUMS (Integrated Public Use </a:t>
+            </a:r>
+            <a:r>
               <a:rPr lang="en-US" sz="3200" dirty="0" err="1" smtClean="0">
                 <a:latin typeface="Arial" pitchFamily="34" charset="0"/>
                 <a:cs typeface="Arial" pitchFamily="34" charset="0"/>
               </a:rPr>
-              <a:t>Kdmflsmfsmfs</a:t>
-            </a:r>
-            <a:endParaRPr lang="en-US" sz="3200" dirty="0" smtClean="0">
-              <a:latin typeface="Arial" pitchFamily="34" charset="0"/>
-              <a:cs typeface="Arial" pitchFamily="34" charset="0"/>
-            </a:endParaRPr>
+              <a:t>Microdata</a:t>
+            </a:r>
+            <a:r>
+              <a:rPr lang="en-US" sz="3200" dirty="0" smtClean="0">
+                <a:latin typeface="Arial" pitchFamily="34" charset="0"/>
+                <a:cs typeface="Arial" pitchFamily="34" charset="0"/>
+              </a:rPr>
+              <a:t> Series), which is census-level data for selected counties in the USA</a:t>
+            </a:r>
           </a:p>
           <a:p>
             <a:pPr marL="863600" lvl="1" indent="-406400">
@@ -5606,14 +5768,255 @@
               <a:buFont typeface="Arial" pitchFamily="34" charset="0"/>
               <a:buChar char="•"/>
             </a:pPr>
-            <a:r>
-              <a:rPr lang="en-US" sz="3200" dirty="0" err="1" smtClean="0">
+            <a:endParaRPr lang="en-US" sz="3200" dirty="0" smtClean="0">
+              <a:latin typeface="Arial" pitchFamily="34" charset="0"/>
+              <a:cs typeface="Arial" pitchFamily="34" charset="0"/>
+            </a:endParaRPr>
+          </a:p>
+          <a:p>
+            <a:pPr marL="863600" lvl="1" indent="-406400">
+              <a:lnSpc>
+                <a:spcPts val="3700"/>
+              </a:lnSpc>
+              <a:buFont typeface="Arial" pitchFamily="34" charset="0"/>
+              <a:buChar char="•"/>
+            </a:pPr>
+            <a:endParaRPr lang="en-US" sz="3200" dirty="0" smtClean="0">
+              <a:latin typeface="Arial" pitchFamily="34" charset="0"/>
+              <a:cs typeface="Arial" pitchFamily="34" charset="0"/>
+            </a:endParaRPr>
+          </a:p>
+          <a:p>
+            <a:pPr marL="863600" lvl="1" indent="-406400">
+              <a:lnSpc>
+                <a:spcPts val="3700"/>
+              </a:lnSpc>
+              <a:buFont typeface="Arial" pitchFamily="34" charset="0"/>
+              <a:buChar char="•"/>
+            </a:pPr>
+            <a:endParaRPr lang="en-US" sz="3200" dirty="0" smtClean="0">
+              <a:latin typeface="Arial" pitchFamily="34" charset="0"/>
+              <a:cs typeface="Arial" pitchFamily="34" charset="0"/>
+            </a:endParaRPr>
+          </a:p>
+          <a:p>
+            <a:pPr marL="863600" lvl="1" indent="-406400">
+              <a:lnSpc>
+                <a:spcPts val="3700"/>
+              </a:lnSpc>
+              <a:buFont typeface="Arial" pitchFamily="34" charset="0"/>
+              <a:buChar char="•"/>
+            </a:pPr>
+            <a:endParaRPr lang="en-US" sz="3200" dirty="0" smtClean="0">
+              <a:latin typeface="Arial" pitchFamily="34" charset="0"/>
+              <a:cs typeface="Arial" pitchFamily="34" charset="0"/>
+            </a:endParaRPr>
+          </a:p>
+          <a:p>
+            <a:pPr marL="863600" lvl="1" indent="-406400">
+              <a:lnSpc>
+                <a:spcPts val="3700"/>
+              </a:lnSpc>
+              <a:buFont typeface="Arial" pitchFamily="34" charset="0"/>
+              <a:buChar char="•"/>
+            </a:pPr>
+            <a:endParaRPr lang="en-US" sz="3200" dirty="0" smtClean="0">
+              <a:latin typeface="Arial" pitchFamily="34" charset="0"/>
+              <a:cs typeface="Arial" pitchFamily="34" charset="0"/>
+            </a:endParaRPr>
+          </a:p>
+          <a:p>
+            <a:pPr marL="863600" lvl="1" indent="-406400">
+              <a:lnSpc>
+                <a:spcPts val="3700"/>
+              </a:lnSpc>
+              <a:buFont typeface="Arial" pitchFamily="34" charset="0"/>
+              <a:buChar char="•"/>
+            </a:pPr>
+            <a:endParaRPr lang="en-US" sz="3200" dirty="0" smtClean="0">
+              <a:latin typeface="Arial" pitchFamily="34" charset="0"/>
+              <a:cs typeface="Arial" pitchFamily="34" charset="0"/>
+            </a:endParaRPr>
+          </a:p>
+          <a:p>
+            <a:pPr marL="863600" lvl="1" indent="-406400">
+              <a:lnSpc>
+                <a:spcPts val="3700"/>
+              </a:lnSpc>
+            </a:pPr>
+            <a:r>
+              <a:rPr lang="en-US" sz="3200" b="1" dirty="0" smtClean="0">
                 <a:latin typeface="Arial" pitchFamily="34" charset="0"/>
                 <a:cs typeface="Arial" pitchFamily="34" charset="0"/>
               </a:rPr>
-              <a:t>kmdlfmsl</a:t>
-            </a:r>
+              <a:t>Results: (</a:t>
+            </a:r>
+            <a:r>
+              <a:rPr lang="en-US" sz="3200" b="1" dirty="0" smtClean="0">
+                <a:solidFill>
+                  <a:srgbClr val="FF0000"/>
+                </a:solidFill>
+                <a:latin typeface="Arial" pitchFamily="34" charset="0"/>
+                <a:cs typeface="Arial" pitchFamily="34" charset="0"/>
+              </a:rPr>
+              <a:t>do we want to add grouping counties into categories??)</a:t>
+            </a:r>
+          </a:p>
+          <a:p>
+            <a:pPr marL="863600" lvl="1" indent="-406400">
+              <a:lnSpc>
+                <a:spcPts val="3700"/>
+              </a:lnSpc>
+            </a:pPr>
+            <a:endParaRPr lang="en-US" sz="3200" b="1" dirty="0" smtClean="0">
+              <a:latin typeface="Arial" pitchFamily="34" charset="0"/>
+              <a:cs typeface="Arial" pitchFamily="34" charset="0"/>
+            </a:endParaRPr>
+          </a:p>
+          <a:p>
+            <a:pPr marL="863600" lvl="1" indent="-406400">
+              <a:lnSpc>
+                <a:spcPts val="3700"/>
+              </a:lnSpc>
+            </a:pPr>
+            <a:r>
+              <a:rPr lang="en-US" sz="3200" b="1" dirty="0" smtClean="0">
+                <a:latin typeface="Arial" pitchFamily="34" charset="0"/>
+                <a:cs typeface="Arial" pitchFamily="34" charset="0"/>
+              </a:rPr>
+              <a:t>   US County Diversity </a:t>
+            </a:r>
+            <a:r>
+              <a:rPr lang="en-US" sz="3200" b="1" dirty="0" err="1" smtClean="0">
+                <a:latin typeface="Arial" pitchFamily="34" charset="0"/>
+                <a:cs typeface="Arial" pitchFamily="34" charset="0"/>
+              </a:rPr>
+              <a:t>Choropleth</a:t>
+            </a:r>
+            <a:r>
+              <a:rPr lang="en-US" sz="3200" b="1" dirty="0" smtClean="0">
+                <a:latin typeface="Arial" pitchFamily="34" charset="0"/>
+                <a:cs typeface="Arial" pitchFamily="34" charset="0"/>
+              </a:rPr>
+              <a:t>          County Diversity Histogram</a:t>
+            </a:r>
+          </a:p>
+          <a:p>
+            <a:pPr marL="863600" lvl="1" indent="-406400">
+              <a:lnSpc>
+                <a:spcPts val="3700"/>
+              </a:lnSpc>
+              <a:buFont typeface="Arial" pitchFamily="34" charset="0"/>
+              <a:buChar char="•"/>
+            </a:pPr>
             <a:endParaRPr lang="en-US" sz="3200" dirty="0" smtClean="0">
+              <a:latin typeface="Arial" pitchFamily="34" charset="0"/>
+              <a:cs typeface="Arial" pitchFamily="34" charset="0"/>
+            </a:endParaRPr>
+          </a:p>
+          <a:p>
+            <a:pPr marL="863600" lvl="1" indent="-406400">
+              <a:lnSpc>
+                <a:spcPts val="3700"/>
+              </a:lnSpc>
+              <a:buFont typeface="Arial" pitchFamily="34" charset="0"/>
+              <a:buChar char="•"/>
+            </a:pPr>
+            <a:endParaRPr lang="en-US" sz="3200" dirty="0" smtClean="0">
+              <a:latin typeface="Arial" pitchFamily="34" charset="0"/>
+              <a:cs typeface="Arial" pitchFamily="34" charset="0"/>
+            </a:endParaRPr>
+          </a:p>
+          <a:p>
+            <a:pPr marL="863600" lvl="1" indent="-406400">
+              <a:lnSpc>
+                <a:spcPts val="3700"/>
+              </a:lnSpc>
+              <a:buFont typeface="Arial" pitchFamily="34" charset="0"/>
+              <a:buChar char="•"/>
+            </a:pPr>
+            <a:endParaRPr lang="en-US" sz="3200" dirty="0" smtClean="0">
+              <a:latin typeface="Arial" pitchFamily="34" charset="0"/>
+              <a:cs typeface="Arial" pitchFamily="34" charset="0"/>
+            </a:endParaRPr>
+          </a:p>
+          <a:p>
+            <a:pPr marL="863600" lvl="1" indent="-406400">
+              <a:lnSpc>
+                <a:spcPts val="3700"/>
+              </a:lnSpc>
+              <a:buFont typeface="Arial" pitchFamily="34" charset="0"/>
+              <a:buChar char="•"/>
+            </a:pPr>
+            <a:endParaRPr lang="en-US" sz="3200" dirty="0" smtClean="0">
+              <a:latin typeface="Arial" pitchFamily="34" charset="0"/>
+              <a:cs typeface="Arial" pitchFamily="34" charset="0"/>
+            </a:endParaRPr>
+          </a:p>
+        </p:txBody>
+      </p:sp>
+      <p:sp>
+        <p:nvSpPr>
+          <p:cNvPr id="201" name="TextBox 200"/>
+          <p:cNvSpPr txBox="1"/>
+          <p:nvPr/>
+        </p:nvSpPr>
+        <p:spPr>
+          <a:xfrm>
+            <a:off x="14859000" y="6829489"/>
+            <a:ext cx="14325600" cy="10531088"/>
+          </a:xfrm>
+          <a:prstGeom prst="rect">
+            <a:avLst/>
+          </a:prstGeom>
+          <a:noFill/>
+        </p:spPr>
+        <p:txBody>
+          <a:bodyPr wrap="square" rtlCol="0">
+            <a:spAutoFit/>
+          </a:bodyPr>
+          <a:lstStyle/>
+          <a:p>
+            <a:pPr marL="863600" lvl="1" indent="-406400">
+              <a:lnSpc>
+                <a:spcPts val="3700"/>
+              </a:lnSpc>
+              <a:buFont typeface="Arial" pitchFamily="34" charset="0"/>
+              <a:buChar char="•"/>
+            </a:pPr>
+            <a:r>
+              <a:rPr lang="en-US" sz="3200" dirty="0" smtClean="0">
+                <a:latin typeface="Arial" pitchFamily="34" charset="0"/>
+                <a:cs typeface="Arial" pitchFamily="34" charset="0"/>
+              </a:rPr>
+              <a:t>Here, we look for correlations between county diversity and educational outcomes</a:t>
+            </a:r>
+          </a:p>
+          <a:p>
+            <a:pPr marL="863600" lvl="1" indent="-406400">
+              <a:lnSpc>
+                <a:spcPts val="3700"/>
+              </a:lnSpc>
+            </a:pPr>
+            <a:endParaRPr lang="en-US" sz="3200" dirty="0" smtClean="0">
+              <a:latin typeface="Arial" pitchFamily="34" charset="0"/>
+              <a:cs typeface="Arial" pitchFamily="34" charset="0"/>
+            </a:endParaRPr>
+          </a:p>
+          <a:p>
+            <a:pPr marL="863600" lvl="1" indent="-406400">
+              <a:lnSpc>
+                <a:spcPts val="3700"/>
+              </a:lnSpc>
+            </a:pPr>
+            <a:r>
+              <a:rPr lang="en-US" sz="3200" b="1" dirty="0" smtClean="0">
+                <a:latin typeface="Arial" pitchFamily="34" charset="0"/>
+                <a:cs typeface="Arial" pitchFamily="34" charset="0"/>
+              </a:rPr>
+              <a:t>Data:</a:t>
+            </a:r>
+            <a:endParaRPr lang="en-US" sz="3200" b="1" dirty="0" smtClean="0">
               <a:latin typeface="Arial" pitchFamily="34" charset="0"/>
               <a:cs typeface="Arial" pitchFamily="34" charset="0"/>
             </a:endParaRPr>
@@ -5625,6 +6028,176 @@
               </a:lnSpc>
             </a:pPr>
             <a:endParaRPr lang="en-US" sz="3200" i="1" dirty="0" smtClean="0">
+              <a:latin typeface="Arial" pitchFamily="34" charset="0"/>
+              <a:cs typeface="Arial" pitchFamily="34" charset="0"/>
+            </a:endParaRPr>
+          </a:p>
+          <a:p>
+            <a:pPr marL="863600" lvl="1" indent="-406400">
+              <a:lnSpc>
+                <a:spcPts val="3700"/>
+              </a:lnSpc>
+            </a:pPr>
+            <a:endParaRPr lang="en-US" sz="3200" i="1" dirty="0" smtClean="0">
+              <a:latin typeface="Arial" pitchFamily="34" charset="0"/>
+              <a:cs typeface="Arial" pitchFamily="34" charset="0"/>
+            </a:endParaRPr>
+          </a:p>
+          <a:p>
+            <a:pPr marL="863600" lvl="1" indent="-406400">
+              <a:lnSpc>
+                <a:spcPts val="3700"/>
+              </a:lnSpc>
+            </a:pPr>
+            <a:endParaRPr lang="en-US" sz="3200" i="1" dirty="0" smtClean="0">
+              <a:latin typeface="Arial" pitchFamily="34" charset="0"/>
+              <a:cs typeface="Arial" pitchFamily="34" charset="0"/>
+            </a:endParaRPr>
+          </a:p>
+          <a:p>
+            <a:pPr marL="863600" lvl="1" indent="-406400">
+              <a:lnSpc>
+                <a:spcPts val="3700"/>
+              </a:lnSpc>
+            </a:pPr>
+            <a:endParaRPr lang="en-US" sz="3200" i="1" dirty="0" smtClean="0">
+              <a:latin typeface="Arial" pitchFamily="34" charset="0"/>
+              <a:cs typeface="Arial" pitchFamily="34" charset="0"/>
+            </a:endParaRPr>
+          </a:p>
+          <a:p>
+            <a:pPr marL="863600" lvl="1" indent="-406400">
+              <a:lnSpc>
+                <a:spcPts val="3700"/>
+              </a:lnSpc>
+            </a:pPr>
+            <a:endParaRPr lang="en-US" sz="3200" i="1" dirty="0" smtClean="0">
+              <a:latin typeface="Arial" pitchFamily="34" charset="0"/>
+              <a:cs typeface="Arial" pitchFamily="34" charset="0"/>
+            </a:endParaRPr>
+          </a:p>
+          <a:p>
+            <a:pPr marL="863600" lvl="1" indent="-406400">
+              <a:lnSpc>
+                <a:spcPts val="3700"/>
+              </a:lnSpc>
+            </a:pPr>
+            <a:r>
+              <a:rPr lang="en-US" sz="3200" b="1" dirty="0" smtClean="0">
+                <a:latin typeface="Arial" pitchFamily="34" charset="0"/>
+                <a:cs typeface="Arial" pitchFamily="34" charset="0"/>
+              </a:rPr>
+              <a:t>Results and Interpretation: (</a:t>
+            </a:r>
+            <a:r>
+              <a:rPr lang="en-US" sz="3200" b="1" dirty="0" smtClean="0">
+                <a:solidFill>
+                  <a:srgbClr val="FF0000"/>
+                </a:solidFill>
+                <a:latin typeface="Arial" pitchFamily="34" charset="0"/>
+                <a:cs typeface="Arial" pitchFamily="34" charset="0"/>
+              </a:rPr>
+              <a:t>INCLUDE SUMMARY STATISTIC)</a:t>
+            </a:r>
+          </a:p>
+          <a:p>
+            <a:pPr marL="863600" lvl="1" indent="-406400">
+              <a:lnSpc>
+                <a:spcPts val="3700"/>
+              </a:lnSpc>
+            </a:pPr>
+            <a:endParaRPr lang="en-US" sz="3200" b="1" dirty="0" smtClean="0">
+              <a:latin typeface="Arial" pitchFamily="34" charset="0"/>
+              <a:cs typeface="Arial" pitchFamily="34" charset="0"/>
+            </a:endParaRPr>
+          </a:p>
+          <a:p>
+            <a:pPr marL="863600" lvl="1" indent="-406400">
+              <a:lnSpc>
+                <a:spcPts val="3700"/>
+              </a:lnSpc>
+            </a:pPr>
+            <a:endParaRPr lang="en-US" sz="3200" b="1" dirty="0" smtClean="0">
+              <a:latin typeface="Arial" pitchFamily="34" charset="0"/>
+              <a:cs typeface="Arial" pitchFamily="34" charset="0"/>
+            </a:endParaRPr>
+          </a:p>
+          <a:p>
+            <a:pPr marL="863600" lvl="1" indent="-406400">
+              <a:lnSpc>
+                <a:spcPts val="3700"/>
+              </a:lnSpc>
+            </a:pPr>
+            <a:endParaRPr lang="en-US" sz="3200" b="1" dirty="0" smtClean="0">
+              <a:latin typeface="Arial" pitchFamily="34" charset="0"/>
+              <a:cs typeface="Arial" pitchFamily="34" charset="0"/>
+            </a:endParaRPr>
+          </a:p>
+          <a:p>
+            <a:pPr marL="863600" lvl="1" indent="-406400">
+              <a:lnSpc>
+                <a:spcPts val="3700"/>
+              </a:lnSpc>
+            </a:pPr>
+            <a:endParaRPr lang="en-US" sz="3200" b="1" dirty="0" smtClean="0">
+              <a:latin typeface="Arial" pitchFamily="34" charset="0"/>
+              <a:cs typeface="Arial" pitchFamily="34" charset="0"/>
+            </a:endParaRPr>
+          </a:p>
+          <a:p>
+            <a:pPr marL="863600" lvl="1" indent="-406400">
+              <a:lnSpc>
+                <a:spcPts val="3700"/>
+              </a:lnSpc>
+            </a:pPr>
+            <a:endParaRPr lang="en-US" sz="3200" b="1" dirty="0" smtClean="0">
+              <a:latin typeface="Arial" pitchFamily="34" charset="0"/>
+              <a:cs typeface="Arial" pitchFamily="34" charset="0"/>
+            </a:endParaRPr>
+          </a:p>
+          <a:p>
+            <a:pPr marL="863600" lvl="1" indent="-406400">
+              <a:lnSpc>
+                <a:spcPts val="3700"/>
+              </a:lnSpc>
+            </a:pPr>
+            <a:endParaRPr lang="en-US" sz="3200" b="1" dirty="0" smtClean="0">
+              <a:latin typeface="Arial" pitchFamily="34" charset="0"/>
+              <a:cs typeface="Arial" pitchFamily="34" charset="0"/>
+            </a:endParaRPr>
+          </a:p>
+          <a:p>
+            <a:pPr marL="863600" lvl="1" indent="-406400">
+              <a:lnSpc>
+                <a:spcPts val="3700"/>
+              </a:lnSpc>
+            </a:pPr>
+            <a:endParaRPr lang="en-US" sz="3200" b="1" dirty="0" smtClean="0">
+              <a:latin typeface="Arial" pitchFamily="34" charset="0"/>
+              <a:cs typeface="Arial" pitchFamily="34" charset="0"/>
+            </a:endParaRPr>
+          </a:p>
+          <a:p>
+            <a:pPr marL="863600" lvl="1" indent="-406400">
+              <a:lnSpc>
+                <a:spcPts val="3700"/>
+              </a:lnSpc>
+            </a:pPr>
+            <a:r>
+              <a:rPr lang="en-US" sz="3200" dirty="0" smtClean="0">
+                <a:latin typeface="Arial" pitchFamily="34" charset="0"/>
+                <a:cs typeface="Arial" pitchFamily="34" charset="0"/>
+              </a:rPr>
+              <a:t>More diverse counties have a higher percentage of people reaching the highest education level, and that less diverse counties have the most number of people with low educational attainment (high school only) </a:t>
+            </a:r>
+          </a:p>
+          <a:p>
+            <a:pPr marL="863600" lvl="1" indent="-406400">
+              <a:lnSpc>
+                <a:spcPts val="3700"/>
+              </a:lnSpc>
+            </a:pPr>
+            <a:endParaRPr lang="en-US" sz="3200" b="1" dirty="0" smtClean="0">
               <a:latin typeface="Arial" pitchFamily="34" charset="0"/>
               <a:cs typeface="Arial" pitchFamily="34" charset="0"/>
             </a:endParaRPr>
@@ -6049,10 +6622,6 @@
               </a:rPr>
               <a:t>a</a:t>
             </a:r>
-            <a:endParaRPr lang="en-US" sz="3200" dirty="0" smtClean="0">
-              <a:latin typeface="Arial" pitchFamily="34" charset="0"/>
-              <a:cs typeface="Arial" pitchFamily="34" charset="0"/>
-            </a:endParaRPr>
           </a:p>
           <a:p>
             <a:pPr marL="863600" lvl="1" indent="-406400">
@@ -6324,142 +6893,6 @@
               </a:rPr>
               <a:t>Stuff about doing further research</a:t>
             </a:r>
-            <a:endParaRPr lang="en-US" sz="3200" dirty="0" smtClean="0">
-              <a:latin typeface="Arial" pitchFamily="34" charset="0"/>
-              <a:cs typeface="Arial" pitchFamily="34" charset="0"/>
-            </a:endParaRPr>
-          </a:p>
-        </p:txBody>
-      </p:sp>
-      <p:sp>
-        <p:nvSpPr>
-          <p:cNvPr id="101" name="Rectangle 100"/>
-          <p:cNvSpPr/>
-          <p:nvPr/>
-        </p:nvSpPr>
-        <p:spPr>
-          <a:xfrm>
-            <a:off x="762000" y="27051000"/>
-            <a:ext cx="6629400" cy="4343400"/>
-          </a:xfrm>
-          <a:prstGeom prst="rect">
-            <a:avLst/>
-          </a:prstGeom>
-        </p:spPr>
-        <p:style>
-          <a:lnRef idx="2">
-            <a:schemeClr val="accent1">
-              <a:shade val="50000"/>
-            </a:schemeClr>
-          </a:lnRef>
-          <a:fillRef idx="1">
-            <a:schemeClr val="accent1"/>
-          </a:fillRef>
-          <a:effectRef idx="0">
-            <a:schemeClr val="accent1"/>
-          </a:effectRef>
-          <a:fontRef idx="minor">
-            <a:schemeClr val="lt1"/>
-          </a:fontRef>
-        </p:style>
-        <p:txBody>
-          <a:bodyPr rtlCol="0" anchor="ctr"/>
-          <a:lstStyle/>
-          <a:p>
-            <a:pPr algn="ctr"/>
-            <a:r>
-              <a:rPr lang="en-US" sz="7200" dirty="0" smtClean="0"/>
-              <a:t>MAP of USA with DIVERSITY INDEX</a:t>
-            </a:r>
-            <a:endParaRPr lang="en-US" sz="7200" dirty="0"/>
-          </a:p>
-        </p:txBody>
-      </p:sp>
-      <p:sp>
-        <p:nvSpPr>
-          <p:cNvPr id="102" name="Rectangle 101"/>
-          <p:cNvSpPr/>
-          <p:nvPr/>
-        </p:nvSpPr>
-        <p:spPr>
-          <a:xfrm>
-            <a:off x="7848600" y="26974800"/>
-            <a:ext cx="6553200" cy="4495800"/>
-          </a:xfrm>
-          <a:prstGeom prst="rect">
-            <a:avLst/>
-          </a:prstGeom>
-        </p:spPr>
-        <p:style>
-          <a:lnRef idx="2">
-            <a:schemeClr val="accent1">
-              <a:shade val="50000"/>
-            </a:schemeClr>
-          </a:lnRef>
-          <a:fillRef idx="1">
-            <a:schemeClr val="accent1"/>
-          </a:fillRef>
-          <a:effectRef idx="0">
-            <a:schemeClr val="accent1"/>
-          </a:effectRef>
-          <a:fontRef idx="minor">
-            <a:schemeClr val="lt1"/>
-          </a:fontRef>
-        </p:style>
-        <p:txBody>
-          <a:bodyPr rtlCol="0" anchor="ctr"/>
-          <a:lstStyle/>
-          <a:p>
-            <a:pPr algn="ctr"/>
-            <a:r>
-              <a:rPr lang="en-US" sz="5400" dirty="0" smtClean="0"/>
-              <a:t>Histogram of how many counties are at the different levels</a:t>
-            </a:r>
-            <a:endParaRPr lang="en-US" sz="5400" dirty="0"/>
-          </a:p>
-        </p:txBody>
-      </p:sp>
-      <p:sp>
-        <p:nvSpPr>
-          <p:cNvPr id="103" name="Rectangle 102"/>
-          <p:cNvSpPr/>
-          <p:nvPr/>
-        </p:nvSpPr>
-        <p:spPr>
-          <a:xfrm>
-            <a:off x="19050000" y="10515600"/>
-            <a:ext cx="10210800" cy="4648200"/>
-          </a:xfrm>
-          <a:prstGeom prst="rect">
-            <a:avLst/>
-          </a:prstGeom>
-        </p:spPr>
-        <p:style>
-          <a:lnRef idx="2">
-            <a:schemeClr val="accent1">
-              <a:shade val="50000"/>
-            </a:schemeClr>
-          </a:lnRef>
-          <a:fillRef idx="1">
-            <a:schemeClr val="accent1"/>
-          </a:fillRef>
-          <a:effectRef idx="0">
-            <a:schemeClr val="accent1"/>
-          </a:effectRef>
-          <a:fontRef idx="minor">
-            <a:schemeClr val="lt1"/>
-          </a:fontRef>
-        </p:style>
-        <p:txBody>
-          <a:bodyPr rtlCol="0" anchor="ctr"/>
-          <a:lstStyle/>
-          <a:p>
-            <a:pPr algn="ctr"/>
-            <a:r>
-              <a:rPr lang="en-US" dirty="0" smtClean="0"/>
-              <a:t>Crappy results, some graphs</a:t>
-            </a:r>
-            <a:endParaRPr lang="en-US" dirty="0"/>
           </a:p>
         </p:txBody>
       </p:sp>
@@ -6471,7 +6904,7 @@
         </p:nvSpPr>
         <p:spPr>
           <a:xfrm>
-            <a:off x="19354800" y="21412200"/>
+            <a:off x="19126200" y="21564600"/>
             <a:ext cx="8686800" cy="5257800"/>
           </a:xfrm>
           <a:prstGeom prst="rect">
@@ -6551,6 +6984,615 @@
           </a:p>
         </p:txBody>
       </p:sp>
+      <p:graphicFrame>
+        <p:nvGraphicFramePr>
+          <p:cNvPr id="44" name="Table 43"/>
+          <p:cNvGraphicFramePr>
+            <a:graphicFrameLocks noGrp="1"/>
+          </p:cNvGraphicFramePr>
+          <p:nvPr/>
+        </p:nvGraphicFramePr>
+        <p:xfrm>
+          <a:off x="685800" y="24094440"/>
+          <a:ext cx="13258800" cy="2895600"/>
+        </p:xfrm>
+        <a:graphic>
+          <a:graphicData uri="http://schemas.openxmlformats.org/drawingml/2006/table">
+            <a:tbl>
+              <a:tblPr firstRow="1" bandRow="1">
+                <a:tableStyleId>{5C22544A-7EE6-4342-B048-85BDC9FD1C3A}</a:tableStyleId>
+              </a:tblPr>
+              <a:tblGrid>
+                <a:gridCol w="2971800"/>
+                <a:gridCol w="8839200"/>
+                <a:gridCol w="1447800"/>
+              </a:tblGrid>
+              <a:tr h="518160">
+                <a:tc>
+                  <a:txBody>
+                    <a:bodyPr/>
+                    <a:lstStyle/>
+                    <a:p>
+                      <a:pPr algn="ctr"/>
+                      <a:r>
+                        <a:rPr lang="en-US" sz="3200" dirty="0" smtClean="0"/>
+                        <a:t>Variable</a:t>
+                      </a:r>
+                      <a:endParaRPr lang="en-US" sz="3200" dirty="0"/>
+                    </a:p>
+                  </a:txBody>
+                  <a:tcPr/>
+                </a:tc>
+                <a:tc>
+                  <a:txBody>
+                    <a:bodyPr/>
+                    <a:lstStyle/>
+                    <a:p>
+                      <a:pPr algn="ctr"/>
+                      <a:r>
+                        <a:rPr lang="en-US" sz="3200" dirty="0" smtClean="0"/>
+                        <a:t>Description</a:t>
+                      </a:r>
+                      <a:endParaRPr lang="en-US" sz="3200" dirty="0"/>
+                    </a:p>
+                  </a:txBody>
+                  <a:tcPr/>
+                </a:tc>
+                <a:tc>
+                  <a:txBody>
+                    <a:bodyPr/>
+                    <a:lstStyle/>
+                    <a:p>
+                      <a:pPr algn="ctr"/>
+                      <a:r>
+                        <a:rPr lang="en-US" sz="3200" dirty="0" smtClean="0"/>
+                        <a:t>Source</a:t>
+                      </a:r>
+                      <a:endParaRPr lang="en-US" sz="3200" dirty="0"/>
+                    </a:p>
+                  </a:txBody>
+                  <a:tcPr/>
+                </a:tc>
+              </a:tr>
+              <a:tr h="713232">
+                <a:tc>
+                  <a:txBody>
+                    <a:bodyPr/>
+                    <a:lstStyle/>
+                    <a:p>
+                      <a:pPr algn="ctr"/>
+                      <a:r>
+                        <a:rPr lang="en-US" sz="2800" dirty="0" smtClean="0">
+                          <a:latin typeface="Arial" pitchFamily="34" charset="0"/>
+                          <a:cs typeface="Arial" pitchFamily="34" charset="0"/>
+                        </a:rPr>
+                        <a:t>Geographic Location</a:t>
+                      </a:r>
+                      <a:endParaRPr lang="en-US" sz="2800" dirty="0">
+                        <a:latin typeface="Arial" pitchFamily="34" charset="0"/>
+                        <a:cs typeface="Arial" pitchFamily="34" charset="0"/>
+                      </a:endParaRPr>
+                    </a:p>
+                  </a:txBody>
+                  <a:tcPr anchor="ctr"/>
+                </a:tc>
+                <a:tc>
+                  <a:txBody>
+                    <a:bodyPr/>
+                    <a:lstStyle/>
+                    <a:p>
+                      <a:r>
+                        <a:rPr lang="en-US" sz="2800" dirty="0" smtClean="0">
+                          <a:latin typeface="Arial" pitchFamily="34" charset="0"/>
+                          <a:cs typeface="Arial" pitchFamily="34" charset="0"/>
+                        </a:rPr>
+                        <a:t>County</a:t>
+                      </a:r>
+                      <a:r>
+                        <a:rPr lang="en-US" sz="2800" baseline="0" dirty="0" smtClean="0">
+                          <a:latin typeface="Arial" pitchFamily="34" charset="0"/>
+                          <a:cs typeface="Arial" pitchFamily="34" charset="0"/>
+                        </a:rPr>
+                        <a:t> location of record, given by state and county FIPS (Federal Info. Processing Standard ) code</a:t>
+                      </a:r>
+                      <a:endParaRPr lang="en-US" sz="2800" dirty="0">
+                        <a:latin typeface="Arial" pitchFamily="34" charset="0"/>
+                        <a:cs typeface="Arial" pitchFamily="34" charset="0"/>
+                      </a:endParaRPr>
+                    </a:p>
+                  </a:txBody>
+                  <a:tcPr anchor="ctr"/>
+                </a:tc>
+                <a:tc>
+                  <a:txBody>
+                    <a:bodyPr/>
+                    <a:lstStyle/>
+                    <a:p>
+                      <a:pPr algn="ctr"/>
+                      <a:r>
+                        <a:rPr lang="en-US" sz="2800" dirty="0" smtClean="0">
+                          <a:latin typeface="Arial" pitchFamily="34" charset="0"/>
+                          <a:cs typeface="Arial" pitchFamily="34" charset="0"/>
+                        </a:rPr>
+                        <a:t>[3]</a:t>
+                      </a:r>
+                      <a:endParaRPr lang="en-US" sz="2800" dirty="0">
+                        <a:latin typeface="Arial" pitchFamily="34" charset="0"/>
+                        <a:cs typeface="Arial" pitchFamily="34" charset="0"/>
+                      </a:endParaRPr>
+                    </a:p>
+                  </a:txBody>
+                  <a:tcPr anchor="ctr"/>
+                </a:tc>
+              </a:tr>
+              <a:tr h="713232">
+                <a:tc>
+                  <a:txBody>
+                    <a:bodyPr/>
+                    <a:lstStyle/>
+                    <a:p>
+                      <a:pPr algn="ctr"/>
+                      <a:r>
+                        <a:rPr lang="en-US" sz="2800" dirty="0" smtClean="0">
+                          <a:latin typeface="Arial" pitchFamily="34" charset="0"/>
+                          <a:cs typeface="Arial" pitchFamily="34" charset="0"/>
+                        </a:rPr>
+                        <a:t>Race</a:t>
+                      </a:r>
+                      <a:endParaRPr lang="en-US" sz="2800" dirty="0">
+                        <a:latin typeface="Arial" pitchFamily="34" charset="0"/>
+                        <a:cs typeface="Arial" pitchFamily="34" charset="0"/>
+                      </a:endParaRPr>
+                    </a:p>
+                  </a:txBody>
+                  <a:tcPr anchor="ctr"/>
+                </a:tc>
+                <a:tc>
+                  <a:txBody>
+                    <a:bodyPr/>
+                    <a:lstStyle/>
+                    <a:p>
+                      <a:r>
+                        <a:rPr lang="en-US" sz="2800" dirty="0" smtClean="0">
+                          <a:latin typeface="Arial" pitchFamily="34" charset="0"/>
+                          <a:cs typeface="Arial" pitchFamily="34" charset="0"/>
+                        </a:rPr>
+                        <a:t>Numerical</a:t>
+                      </a:r>
+                      <a:r>
+                        <a:rPr lang="en-US" sz="2800" baseline="0" dirty="0" smtClean="0">
+                          <a:latin typeface="Arial" pitchFamily="34" charset="0"/>
+                          <a:cs typeface="Arial" pitchFamily="34" charset="0"/>
+                        </a:rPr>
+                        <a:t> code corresponding to race of individual: white, black,  American Indian, Chinese, Japanese, Pacific Islander, other, 2+ races</a:t>
+                      </a:r>
+                      <a:endParaRPr lang="en-US" sz="2800" dirty="0">
+                        <a:latin typeface="Arial" pitchFamily="34" charset="0"/>
+                        <a:cs typeface="Arial" pitchFamily="34" charset="0"/>
+                      </a:endParaRPr>
+                    </a:p>
+                  </a:txBody>
+                  <a:tcPr anchor="ctr"/>
+                </a:tc>
+                <a:tc>
+                  <a:txBody>
+                    <a:bodyPr/>
+                    <a:lstStyle/>
+                    <a:p>
+                      <a:pPr algn="ctr"/>
+                      <a:r>
+                        <a:rPr lang="en-US" sz="2800" dirty="0" smtClean="0">
+                          <a:latin typeface="Arial" pitchFamily="34" charset="0"/>
+                          <a:cs typeface="Arial" pitchFamily="34" charset="0"/>
+                        </a:rPr>
+                        <a:t>[3] </a:t>
+                      </a:r>
+                      <a:endParaRPr lang="en-US" sz="2800" dirty="0">
+                        <a:latin typeface="Arial" pitchFamily="34" charset="0"/>
+                        <a:cs typeface="Arial" pitchFamily="34" charset="0"/>
+                      </a:endParaRPr>
+                    </a:p>
+                  </a:txBody>
+                  <a:tcPr anchor="ctr"/>
+                </a:tc>
+              </a:tr>
+            </a:tbl>
+          </a:graphicData>
+        </a:graphic>
+      </p:graphicFrame>
+      <p:pic>
+        <p:nvPicPr>
+          <p:cNvPr id="46" name="Picture 45" descr="workflow.png"/>
+          <p:cNvPicPr>
+            <a:picLocks noChangeAspect="1"/>
+          </p:cNvPicPr>
+          <p:nvPr/>
+        </p:nvPicPr>
+        <p:blipFill>
+          <a:blip r:embed="rId4"/>
+          <a:stretch>
+            <a:fillRect/>
+          </a:stretch>
+        </p:blipFill>
+        <p:spPr>
+          <a:xfrm>
+            <a:off x="21727141" y="16454119"/>
+            <a:ext cx="436918" cy="10161"/>
+          </a:xfrm>
+          <a:prstGeom prst="rect">
+            <a:avLst/>
+          </a:prstGeom>
+        </p:spPr>
+      </p:pic>
+      <p:pic>
+        <p:nvPicPr>
+          <p:cNvPr id="47" name="Picture 46" descr="g4890.png"/>
+          <p:cNvPicPr>
+            <a:picLocks noChangeAspect="1"/>
+          </p:cNvPicPr>
+          <p:nvPr/>
+        </p:nvPicPr>
+        <p:blipFill>
+          <a:blip r:embed="rId5"/>
+          <a:stretch>
+            <a:fillRect/>
+          </a:stretch>
+        </p:blipFill>
+        <p:spPr>
+          <a:xfrm>
+            <a:off x="2438400" y="11388736"/>
+            <a:ext cx="9753600" cy="2860664"/>
+          </a:xfrm>
+          <a:prstGeom prst="rect">
+            <a:avLst/>
+          </a:prstGeom>
+        </p:spPr>
+      </p:pic>
+      <p:pic>
+        <p:nvPicPr>
+          <p:cNvPr id="49" name="Picture 48" descr="Diversity Equation.gif"/>
+          <p:cNvPicPr>
+            <a:picLocks noChangeAspect="1"/>
+          </p:cNvPicPr>
+          <p:nvPr/>
+        </p:nvPicPr>
+        <p:blipFill>
+          <a:blip r:embed="rId6"/>
+          <a:stretch>
+            <a:fillRect/>
+          </a:stretch>
+        </p:blipFill>
+        <p:spPr>
+          <a:xfrm>
+            <a:off x="5718464" y="18722219"/>
+            <a:ext cx="3120736" cy="1089781"/>
+          </a:xfrm>
+          <a:prstGeom prst="rect">
+            <a:avLst/>
+          </a:prstGeom>
+        </p:spPr>
+      </p:pic>
+      <p:pic>
+        <p:nvPicPr>
+          <p:cNvPr id="1027" name="Picture 3"/>
+          <p:cNvPicPr>
+            <a:picLocks noChangeAspect="1" noChangeArrowheads="1"/>
+          </p:cNvPicPr>
+          <p:nvPr/>
+        </p:nvPicPr>
+        <p:blipFill>
+          <a:blip r:embed="rId7"/>
+          <a:srcRect/>
+          <a:stretch>
+            <a:fillRect/>
+          </a:stretch>
+        </p:blipFill>
+        <p:spPr bwMode="auto">
+          <a:xfrm>
+            <a:off x="1981200" y="29260800"/>
+            <a:ext cx="3810000" cy="2789583"/>
+          </a:xfrm>
+          <a:prstGeom prst="rect">
+            <a:avLst/>
+          </a:prstGeom>
+          <a:noFill/>
+          <a:ln w="9525">
+            <a:noFill/>
+            <a:miter lim="800000"/>
+            <a:headEnd/>
+            <a:tailEnd/>
+          </a:ln>
+          <a:effectLst/>
+        </p:spPr>
+      </p:pic>
+      <p:pic>
+        <p:nvPicPr>
+          <p:cNvPr id="1028" name="Picture 4"/>
+          <p:cNvPicPr>
+            <a:picLocks noChangeAspect="1" noChangeArrowheads="1"/>
+          </p:cNvPicPr>
+          <p:nvPr/>
+        </p:nvPicPr>
+        <p:blipFill>
+          <a:blip r:embed="rId8"/>
+          <a:srcRect/>
+          <a:stretch>
+            <a:fillRect/>
+          </a:stretch>
+        </p:blipFill>
+        <p:spPr bwMode="auto">
+          <a:xfrm>
+            <a:off x="8382000" y="28956000"/>
+            <a:ext cx="5572125" cy="3200400"/>
+          </a:xfrm>
+          <a:prstGeom prst="rect">
+            <a:avLst/>
+          </a:prstGeom>
+          <a:noFill/>
+          <a:ln w="9525">
+            <a:noFill/>
+            <a:miter lim="800000"/>
+            <a:headEnd/>
+            <a:tailEnd/>
+          </a:ln>
+          <a:effectLst/>
+        </p:spPr>
+      </p:pic>
+      <p:sp>
+        <p:nvSpPr>
+          <p:cNvPr id="50" name="Rectangle 49"/>
+          <p:cNvSpPr/>
+          <p:nvPr/>
+        </p:nvSpPr>
+        <p:spPr>
+          <a:xfrm>
+            <a:off x="1219200" y="29108400"/>
+            <a:ext cx="12420600" cy="2438400"/>
+          </a:xfrm>
+          <a:prstGeom prst="rect">
+            <a:avLst/>
+          </a:prstGeom>
+        </p:spPr>
+        <p:style>
+          <a:lnRef idx="2">
+            <a:schemeClr val="accent1">
+              <a:shade val="50000"/>
+            </a:schemeClr>
+          </a:lnRef>
+          <a:fillRef idx="1">
+            <a:schemeClr val="accent1"/>
+          </a:fillRef>
+          <a:effectRef idx="0">
+            <a:schemeClr val="accent1"/>
+          </a:effectRef>
+          <a:fontRef idx="minor">
+            <a:schemeClr val="lt1"/>
+          </a:fontRef>
+        </p:style>
+        <p:txBody>
+          <a:bodyPr rtlCol="0" anchor="ctr"/>
+          <a:lstStyle/>
+          <a:p>
+            <a:pPr algn="ctr"/>
+            <a:r>
+              <a:rPr lang="en-US" dirty="0" smtClean="0"/>
+              <a:t>Add these puppies</a:t>
+            </a:r>
+            <a:endParaRPr lang="en-US" dirty="0"/>
+          </a:p>
+        </p:txBody>
+      </p:sp>
+      <p:graphicFrame>
+        <p:nvGraphicFramePr>
+          <p:cNvPr id="56" name="Table 55"/>
+          <p:cNvGraphicFramePr>
+            <a:graphicFrameLocks noGrp="1"/>
+          </p:cNvGraphicFramePr>
+          <p:nvPr/>
+        </p:nvGraphicFramePr>
+        <p:xfrm>
+          <a:off x="15621000" y="8869680"/>
+          <a:ext cx="13258800" cy="1950720"/>
+        </p:xfrm>
+        <a:graphic>
+          <a:graphicData uri="http://schemas.openxmlformats.org/drawingml/2006/table">
+            <a:tbl>
+              <a:tblPr firstRow="1" bandRow="1">
+                <a:tableStyleId>{5C22544A-7EE6-4342-B048-85BDC9FD1C3A}</a:tableStyleId>
+              </a:tblPr>
+              <a:tblGrid>
+                <a:gridCol w="2209800"/>
+                <a:gridCol w="9601200"/>
+                <a:gridCol w="1447800"/>
+              </a:tblGrid>
+              <a:tr h="518160">
+                <a:tc>
+                  <a:txBody>
+                    <a:bodyPr/>
+                    <a:lstStyle/>
+                    <a:p>
+                      <a:pPr algn="ctr"/>
+                      <a:r>
+                        <a:rPr lang="en-US" sz="3200" dirty="0" smtClean="0"/>
+                        <a:t>Variable</a:t>
+                      </a:r>
+                      <a:endParaRPr lang="en-US" sz="3200" dirty="0"/>
+                    </a:p>
+                  </a:txBody>
+                  <a:tcPr/>
+                </a:tc>
+                <a:tc>
+                  <a:txBody>
+                    <a:bodyPr/>
+                    <a:lstStyle/>
+                    <a:p>
+                      <a:pPr algn="ctr"/>
+                      <a:r>
+                        <a:rPr lang="en-US" sz="3200" dirty="0" smtClean="0"/>
+                        <a:t>Description</a:t>
+                      </a:r>
+                      <a:endParaRPr lang="en-US" sz="3200" dirty="0"/>
+                    </a:p>
+                  </a:txBody>
+                  <a:tcPr/>
+                </a:tc>
+                <a:tc>
+                  <a:txBody>
+                    <a:bodyPr/>
+                    <a:lstStyle/>
+                    <a:p>
+                      <a:pPr algn="ctr"/>
+                      <a:r>
+                        <a:rPr lang="en-US" sz="3200" dirty="0" smtClean="0"/>
+                        <a:t>Source</a:t>
+                      </a:r>
+                      <a:endParaRPr lang="en-US" sz="3200" dirty="0"/>
+                    </a:p>
+                  </a:txBody>
+                  <a:tcPr/>
+                </a:tc>
+              </a:tr>
+              <a:tr h="713232">
+                <a:tc>
+                  <a:txBody>
+                    <a:bodyPr/>
+                    <a:lstStyle/>
+                    <a:p>
+                      <a:pPr algn="ctr"/>
+                      <a:r>
+                        <a:rPr lang="en-US" sz="2800" dirty="0" smtClean="0">
+                          <a:latin typeface="Arial" pitchFamily="34" charset="0"/>
+                          <a:cs typeface="Arial" pitchFamily="34" charset="0"/>
+                        </a:rPr>
+                        <a:t>Educational Attainment</a:t>
+                      </a:r>
+                      <a:endParaRPr lang="en-US" sz="2800" dirty="0">
+                        <a:latin typeface="Arial" pitchFamily="34" charset="0"/>
+                        <a:cs typeface="Arial" pitchFamily="34" charset="0"/>
+                      </a:endParaRPr>
+                    </a:p>
+                  </a:txBody>
+                  <a:tcPr anchor="ctr"/>
+                </a:tc>
+                <a:tc>
+                  <a:txBody>
+                    <a:bodyPr/>
+                    <a:lstStyle/>
+                    <a:p>
+                      <a:r>
+                        <a:rPr lang="en-US" sz="2800" dirty="0" smtClean="0">
+                          <a:latin typeface="Arial" pitchFamily="34" charset="0"/>
+                          <a:cs typeface="Arial" pitchFamily="34" charset="0"/>
+                        </a:rPr>
+                        <a:t>Code</a:t>
+                      </a:r>
+                      <a:r>
+                        <a:rPr lang="en-US" sz="2800" baseline="0" dirty="0" smtClean="0">
+                          <a:latin typeface="Arial" pitchFamily="34" charset="0"/>
+                          <a:cs typeface="Arial" pitchFamily="34" charset="0"/>
+                        </a:rPr>
+                        <a:t> corresponding to highest level of education achieved: no high school,  high school diploma,  Associate’s degree, Bachelor’s degree,</a:t>
+                      </a:r>
+                      <a:endParaRPr lang="en-US" sz="2800" dirty="0">
+                        <a:latin typeface="Arial" pitchFamily="34" charset="0"/>
+                        <a:cs typeface="Arial" pitchFamily="34" charset="0"/>
+                      </a:endParaRPr>
+                    </a:p>
+                  </a:txBody>
+                  <a:tcPr anchor="ctr"/>
+                </a:tc>
+                <a:tc>
+                  <a:txBody>
+                    <a:bodyPr/>
+                    <a:lstStyle/>
+                    <a:p>
+                      <a:pPr algn="ctr"/>
+                      <a:r>
+                        <a:rPr lang="en-US" sz="2800" dirty="0" smtClean="0">
+                          <a:latin typeface="Arial" pitchFamily="34" charset="0"/>
+                          <a:cs typeface="Arial" pitchFamily="34" charset="0"/>
+                        </a:rPr>
+                        <a:t>[4]</a:t>
+                      </a:r>
+                      <a:endParaRPr lang="en-US" sz="2800" dirty="0">
+                        <a:latin typeface="Arial" pitchFamily="34" charset="0"/>
+                        <a:cs typeface="Arial" pitchFamily="34" charset="0"/>
+                      </a:endParaRPr>
+                    </a:p>
+                  </a:txBody>
+                  <a:tcPr anchor="ctr"/>
+                </a:tc>
+              </a:tr>
+            </a:tbl>
+          </a:graphicData>
+        </a:graphic>
+      </p:graphicFrame>
+      <p:pic>
+        <p:nvPicPr>
+          <p:cNvPr id="1030" name="Picture 6"/>
+          <p:cNvPicPr>
+            <a:picLocks noChangeAspect="1" noChangeArrowheads="1"/>
+          </p:cNvPicPr>
+          <p:nvPr/>
+        </p:nvPicPr>
+        <p:blipFill>
+          <a:blip r:embed="rId9"/>
+          <a:srcRect/>
+          <a:stretch>
+            <a:fillRect/>
+          </a:stretch>
+        </p:blipFill>
+        <p:spPr bwMode="auto">
+          <a:xfrm>
+            <a:off x="16687800" y="11696700"/>
+            <a:ext cx="4547880" cy="3049913"/>
+          </a:xfrm>
+          <a:prstGeom prst="rect">
+            <a:avLst/>
+          </a:prstGeom>
+          <a:noFill/>
+          <a:ln w="9525">
+            <a:noFill/>
+            <a:miter lim="800000"/>
+            <a:headEnd/>
+            <a:tailEnd/>
+          </a:ln>
+          <a:effectLst/>
+        </p:spPr>
+      </p:pic>
+      <p:pic>
+        <p:nvPicPr>
+          <p:cNvPr id="1031" name="Picture 7"/>
+          <p:cNvPicPr>
+            <a:picLocks noChangeAspect="1" noChangeArrowheads="1"/>
+          </p:cNvPicPr>
+          <p:nvPr/>
+        </p:nvPicPr>
+        <p:blipFill>
+          <a:blip r:embed="rId10"/>
+          <a:srcRect/>
+          <a:stretch>
+            <a:fillRect/>
+          </a:stretch>
+        </p:blipFill>
+        <p:spPr bwMode="auto">
+          <a:xfrm>
+            <a:off x="22707599" y="11709312"/>
+            <a:ext cx="4495801" cy="3110903"/>
+          </a:xfrm>
+          <a:prstGeom prst="rect">
+            <a:avLst/>
+          </a:prstGeom>
+          <a:noFill/>
+          <a:ln w="9525">
+            <a:noFill/>
+            <a:miter lim="800000"/>
+            <a:headEnd/>
+            <a:tailEnd/>
+          </a:ln>
+          <a:effectLst/>
+        </p:spPr>
+      </p:pic>
     </p:spTree>
   </p:cSld>
   <p:clrMapOvr>

</xml_diff>

<commit_message>
upload of final poster for printing...
</commit_message>
<xml_diff>
--- a/Final Poster/diversity poster.pptx
+++ b/Final Poster/diversity poster.pptx
@@ -193,7 +193,7 @@
             <a:fld id="{33456894-2714-4AE7-9AD4-576C5E12D5F7}" type="datetimeFigureOut">
               <a:rPr lang="en-US" smtClean="0"/>
               <a:pPr/>
-              <a:t>11/30/2016</a:t>
+              <a:t>12/1/2016</a:t>
             </a:fld>
             <a:endParaRPr lang="en-US"/>
           </a:p>
@@ -723,7 +723,7 @@
             <a:fld id="{44B7EFBE-001D-4618-B40D-A5F9B7D86AF5}" type="datetimeFigureOut">
               <a:rPr lang="en-US" smtClean="0"/>
               <a:pPr/>
-              <a:t>11/30/2016</a:t>
+              <a:t>12/1/2016</a:t>
             </a:fld>
             <a:endParaRPr lang="en-US"/>
           </a:p>
@@ -890,7 +890,7 @@
             <a:fld id="{44B7EFBE-001D-4618-B40D-A5F9B7D86AF5}" type="datetimeFigureOut">
               <a:rPr lang="en-US" smtClean="0"/>
               <a:pPr/>
-              <a:t>11/30/2016</a:t>
+              <a:t>12/1/2016</a:t>
             </a:fld>
             <a:endParaRPr lang="en-US"/>
           </a:p>
@@ -1067,7 +1067,7 @@
             <a:fld id="{44B7EFBE-001D-4618-B40D-A5F9B7D86AF5}" type="datetimeFigureOut">
               <a:rPr lang="en-US" smtClean="0"/>
               <a:pPr/>
-              <a:t>11/30/2016</a:t>
+              <a:t>12/1/2016</a:t>
             </a:fld>
             <a:endParaRPr lang="en-US"/>
           </a:p>
@@ -1234,7 +1234,7 @@
             <a:fld id="{44B7EFBE-001D-4618-B40D-A5F9B7D86AF5}" type="datetimeFigureOut">
               <a:rPr lang="en-US" smtClean="0"/>
               <a:pPr/>
-              <a:t>11/30/2016</a:t>
+              <a:t>12/1/2016</a:t>
             </a:fld>
             <a:endParaRPr lang="en-US"/>
           </a:p>
@@ -1477,7 +1477,7 @@
             <a:fld id="{44B7EFBE-001D-4618-B40D-A5F9B7D86AF5}" type="datetimeFigureOut">
               <a:rPr lang="en-US" smtClean="0"/>
               <a:pPr/>
-              <a:t>11/30/2016</a:t>
+              <a:t>12/1/2016</a:t>
             </a:fld>
             <a:endParaRPr lang="en-US"/>
           </a:p>
@@ -1762,7 +1762,7 @@
             <a:fld id="{44B7EFBE-001D-4618-B40D-A5F9B7D86AF5}" type="datetimeFigureOut">
               <a:rPr lang="en-US" smtClean="0"/>
               <a:pPr/>
-              <a:t>11/30/2016</a:t>
+              <a:t>12/1/2016</a:t>
             </a:fld>
             <a:endParaRPr lang="en-US"/>
           </a:p>
@@ -2186,7 +2186,7 @@
             <a:fld id="{44B7EFBE-001D-4618-B40D-A5F9B7D86AF5}" type="datetimeFigureOut">
               <a:rPr lang="en-US" smtClean="0"/>
               <a:pPr/>
-              <a:t>11/30/2016</a:t>
+              <a:t>12/1/2016</a:t>
             </a:fld>
             <a:endParaRPr lang="en-US"/>
           </a:p>
@@ -2301,7 +2301,7 @@
             <a:fld id="{44B7EFBE-001D-4618-B40D-A5F9B7D86AF5}" type="datetimeFigureOut">
               <a:rPr lang="en-US" smtClean="0"/>
               <a:pPr/>
-              <a:t>11/30/2016</a:t>
+              <a:t>12/1/2016</a:t>
             </a:fld>
             <a:endParaRPr lang="en-US"/>
           </a:p>
@@ -2393,7 +2393,7 @@
             <a:fld id="{44B7EFBE-001D-4618-B40D-A5F9B7D86AF5}" type="datetimeFigureOut">
               <a:rPr lang="en-US" smtClean="0"/>
               <a:pPr/>
-              <a:t>11/30/2016</a:t>
+              <a:t>12/1/2016</a:t>
             </a:fld>
             <a:endParaRPr lang="en-US"/>
           </a:p>
@@ -2667,7 +2667,7 @@
             <a:fld id="{44B7EFBE-001D-4618-B40D-A5F9B7D86AF5}" type="datetimeFigureOut">
               <a:rPr lang="en-US" smtClean="0"/>
               <a:pPr/>
-              <a:t>11/30/2016</a:t>
+              <a:t>12/1/2016</a:t>
             </a:fld>
             <a:endParaRPr lang="en-US"/>
           </a:p>
@@ -2917,7 +2917,7 @@
             <a:fld id="{44B7EFBE-001D-4618-B40D-A5F9B7D86AF5}" type="datetimeFigureOut">
               <a:rPr lang="en-US" smtClean="0"/>
               <a:pPr/>
-              <a:t>11/30/2016</a:t>
+              <a:t>12/1/2016</a:t>
             </a:fld>
             <a:endParaRPr lang="en-US"/>
           </a:p>
@@ -3142,7 +3142,7 @@
             <a:fld id="{44B7EFBE-001D-4618-B40D-A5F9B7D86AF5}" type="datetimeFigureOut">
               <a:rPr lang="en-US" smtClean="0"/>
               <a:pPr/>
-              <a:t>11/30/2016</a:t>
+              <a:t>12/1/2016</a:t>
             </a:fld>
             <a:endParaRPr lang="en-US"/>
           </a:p>
@@ -3742,7 +3742,19 @@
                   <a:latin typeface="Arial" pitchFamily="34" charset="0"/>
                   <a:cs typeface="Arial" pitchFamily="34" charset="0"/>
                 </a:rPr>
-                <a:t>And Health-Related Outcomes</a:t>
+                <a:t>and </a:t>
+              </a:r>
+              <a:r>
+                <a:rPr lang="en-US" sz="8000" b="1" dirty="0" smtClean="0">
+                  <a:solidFill>
+                    <a:schemeClr val="bg1">
+                      <a:lumMod val="85000"/>
+                    </a:schemeClr>
+                  </a:solidFill>
+                  <a:latin typeface="Arial" pitchFamily="34" charset="0"/>
+                  <a:cs typeface="Arial" pitchFamily="34" charset="0"/>
+                </a:rPr>
+                <a:t>Health-Related Outcomes</a:t>
               </a:r>
             </a:p>
           </p:txBody>
@@ -3829,15 +3841,6 @@
                 </a:rPr>
                 <a:t>– Section 01, Group 6</a:t>
               </a:r>
-              <a:endParaRPr lang="en-US" sz="4400" dirty="0" smtClean="0">
-                <a:solidFill>
-                  <a:schemeClr val="bg1">
-                    <a:lumMod val="85000"/>
-                  </a:schemeClr>
-                </a:solidFill>
-                <a:latin typeface="Arial" pitchFamily="34" charset="0"/>
-                <a:cs typeface="Arial" pitchFamily="34" charset="0"/>
-              </a:endParaRPr>
             </a:p>
             <a:p>
               <a:r>
@@ -3885,8 +3888,29 @@
                   <a:latin typeface="Arial" pitchFamily="34" charset="0"/>
                   <a:cs typeface="Arial" pitchFamily="34" charset="0"/>
                 </a:rPr>
-                <a:t>Department of Statistics, Rice University,</a:t>
+                <a:t>Department of Statistics, Rice </a:t>
               </a:r>
+              <a:r>
+                <a:rPr lang="en-US" sz="4400" i="1" dirty="0" smtClean="0">
+                  <a:solidFill>
+                    <a:schemeClr val="bg1">
+                      <a:lumMod val="85000"/>
+                    </a:schemeClr>
+                  </a:solidFill>
+                  <a:latin typeface="Arial" pitchFamily="34" charset="0"/>
+                  <a:cs typeface="Arial" pitchFamily="34" charset="0"/>
+                </a:rPr>
+                <a:t>University</a:t>
+              </a:r>
+              <a:endParaRPr lang="en-US" sz="4400" i="1" dirty="0" smtClean="0">
+                <a:solidFill>
+                  <a:schemeClr val="bg1">
+                    <a:lumMod val="85000"/>
+                  </a:schemeClr>
+                </a:solidFill>
+                <a:latin typeface="Arial" pitchFamily="34" charset="0"/>
+                <a:cs typeface="Arial" pitchFamily="34" charset="0"/>
+              </a:endParaRPr>
             </a:p>
           </p:txBody>
         </p:sp>
@@ -3985,14 +4009,7 @@
                   <a:latin typeface="Arial" pitchFamily="34" charset="0"/>
                   <a:cs typeface="Arial" pitchFamily="34" charset="0"/>
                 </a:rPr>
-                <a:t>[1] </a:t>
-              </a:r>
-              <a:r>
-                <a:rPr lang="en-US" sz="1300" dirty="0" smtClean="0">
-                  <a:latin typeface="Arial" pitchFamily="34" charset="0"/>
-                  <a:cs typeface="Arial" pitchFamily="34" charset="0"/>
-                </a:rPr>
-                <a:t>“Are There Really Any Tangible Benefits to Diversity and Inclusion? Isn’t This Just Corporate Jargon?” Government Agency. </a:t>
+                <a:t>[1] “Are There Really Any Tangible Benefits to Diversity and Inclusion? Isn’t This Just Corporate Jargon?” Government Agency. </a:t>
               </a:r>
               <a:r>
                 <a:rPr lang="en-US" sz="1300" i="1" dirty="0" smtClean="0">
@@ -4057,14 +4074,7 @@
                   <a:latin typeface="Arial" pitchFamily="34" charset="0"/>
                   <a:cs typeface="Arial" pitchFamily="34" charset="0"/>
                 </a:rPr>
-                <a:t>, December 9, 2014. https://www.entrepreneur.com/article/240550</a:t>
-              </a:r>
-              <a:r>
-                <a:rPr lang="en-US" sz="1300" dirty="0" smtClean="0">
-                  <a:latin typeface="Arial" pitchFamily="34" charset="0"/>
-                  <a:cs typeface="Arial" pitchFamily="34" charset="0"/>
-                </a:rPr>
-                <a:t>.</a:t>
+                <a:t>, December 9, 2014. https://www.entrepreneur.com/article/240550.</a:t>
               </a:r>
             </a:p>
             <a:p>
@@ -4073,14 +4083,7 @@
                   <a:latin typeface="Arial" pitchFamily="34" charset="0"/>
                   <a:cs typeface="Arial" pitchFamily="34" charset="0"/>
                 </a:rPr>
-                <a:t>[3] “Diversity </a:t>
-              </a:r>
-              <a:r>
-                <a:rPr lang="en-US" sz="1300" dirty="0" smtClean="0">
-                  <a:latin typeface="Arial" pitchFamily="34" charset="0"/>
-                  <a:cs typeface="Arial" pitchFamily="34" charset="0"/>
-                </a:rPr>
-                <a:t>Index of US Counties | </a:t>
+                <a:t>[3] “Diversity Index of US Counties | </a:t>
               </a:r>
               <a:r>
                 <a:rPr lang="en-US" sz="1300" dirty="0" err="1" smtClean="0">
@@ -4094,19 +4097,8 @@
                   <a:latin typeface="Arial" pitchFamily="34" charset="0"/>
                   <a:cs typeface="Arial" pitchFamily="34" charset="0"/>
                 </a:rPr>
-                <a:t>.” Accessed November 30, 2016. https://www.kaggle.com/mikejohnsonjr/us-counties-diversity-index</a:t>
+                <a:t>.” Accessed November 30, 2016. https://www.kaggle.com/mikejohnsonjr/us-counties-diversity-index.</a:t>
               </a:r>
-              <a:r>
-                <a:rPr lang="en-US" sz="1300" dirty="0" smtClean="0">
-                  <a:latin typeface="Arial" pitchFamily="34" charset="0"/>
-                  <a:cs typeface="Arial" pitchFamily="34" charset="0"/>
-                </a:rPr>
-                <a:t>.</a:t>
-              </a:r>
-              <a:endParaRPr lang="en-US" sz="1300" dirty="0" smtClean="0">
-                <a:latin typeface="Arial" pitchFamily="34" charset="0"/>
-                <a:cs typeface="Arial" pitchFamily="34" charset="0"/>
-              </a:endParaRPr>
             </a:p>
             <a:p>
               <a:r>
@@ -4193,14 +4185,7 @@
                   <a:latin typeface="Arial" pitchFamily="34" charset="0"/>
                   <a:cs typeface="Arial" pitchFamily="34" charset="0"/>
                 </a:rPr>
-                <a:t>[5] “</a:t>
-              </a:r>
-              <a:r>
-                <a:rPr lang="en-US" sz="1300" dirty="0" smtClean="0">
-                  <a:latin typeface="Arial" pitchFamily="34" charset="0"/>
-                  <a:cs typeface="Arial" pitchFamily="34" charset="0"/>
-                </a:rPr>
-                <a:t>2015 US County Race Data.” Government Agency. </a:t>
+                <a:t>[5] “2015 US County Race Data.” Government Agency. </a:t>
               </a:r>
               <a:r>
                 <a:rPr lang="en-US" sz="1300" i="1" dirty="0" smtClean="0">
@@ -4214,14 +4199,7 @@
                   <a:latin typeface="Arial" pitchFamily="34" charset="0"/>
                   <a:cs typeface="Arial" pitchFamily="34" charset="0"/>
                 </a:rPr>
-                <a:t>. Accessed November 30, 2016. https://www.census.gov/popest/data/counties/asrh/2015/files/CC-EST2015-ALLDATA.csv</a:t>
-              </a:r>
-              <a:r>
-                <a:rPr lang="en-US" sz="1300" dirty="0" smtClean="0">
-                  <a:latin typeface="Arial" pitchFamily="34" charset="0"/>
-                  <a:cs typeface="Arial" pitchFamily="34" charset="0"/>
-                </a:rPr>
-                <a:t>.</a:t>
+                <a:t>. Accessed November 30, 2016. https://www.census.gov/popest/data/counties/asrh/2015/files/CC-EST2015-ALLDATA.csv.</a:t>
               </a:r>
             </a:p>
             <a:p>
@@ -4230,14 +4208,7 @@
                   <a:latin typeface="Arial" pitchFamily="34" charset="0"/>
                   <a:cs typeface="Arial" pitchFamily="34" charset="0"/>
                 </a:rPr>
-                <a:t>[6] </a:t>
-              </a:r>
-              <a:r>
-                <a:rPr lang="en-US" sz="1300" dirty="0" smtClean="0">
-                  <a:latin typeface="Arial" pitchFamily="34" charset="0"/>
-                  <a:cs typeface="Arial" pitchFamily="34" charset="0"/>
-                </a:rPr>
-                <a:t>“IHME US Data for Download.” Government Agency. </a:t>
+                <a:t>[6] “IHME US Data for Download.” Government Agency. </a:t>
               </a:r>
               <a:r>
                 <a:rPr lang="en-US" sz="1300" i="1" dirty="0" smtClean="0">
@@ -4251,14 +4222,7 @@
                   <a:latin typeface="Arial" pitchFamily="34" charset="0"/>
                   <a:cs typeface="Arial" pitchFamily="34" charset="0"/>
                 </a:rPr>
-                <a:t>. Accessed November 30, 2016. http://www.healthdata.org/us-health/data-download</a:t>
-              </a:r>
-              <a:r>
-                <a:rPr lang="en-US" sz="1300" dirty="0" smtClean="0">
-                  <a:latin typeface="Arial" pitchFamily="34" charset="0"/>
-                  <a:cs typeface="Arial" pitchFamily="34" charset="0"/>
-                </a:rPr>
-                <a:t>.</a:t>
+                <a:t>. Accessed November 30, 2016. http://www.healthdata.org/us-health/data-download.</a:t>
               </a:r>
             </a:p>
             <a:p>
@@ -4267,14 +4231,7 @@
                   <a:latin typeface="Arial" pitchFamily="34" charset="0"/>
                   <a:cs typeface="Arial" pitchFamily="34" charset="0"/>
                 </a:rPr>
-                <a:t>[7] </a:t>
-              </a:r>
-              <a:r>
-                <a:rPr lang="en-US" sz="1300" dirty="0" smtClean="0">
-                  <a:latin typeface="Arial" pitchFamily="34" charset="0"/>
-                  <a:cs typeface="Arial" pitchFamily="34" charset="0"/>
-                </a:rPr>
-                <a:t>“USDA-ERS County-Level Datasets.” Government Agency. </a:t>
+                <a:t>[7] “USDA-ERS County-Level Datasets.” Government Agency. </a:t>
               </a:r>
               <a:r>
                 <a:rPr lang="en-US" sz="1300" i="1" dirty="0" smtClean="0">
@@ -4288,19 +4245,8 @@
                   <a:latin typeface="Arial" pitchFamily="34" charset="0"/>
                   <a:cs typeface="Arial" pitchFamily="34" charset="0"/>
                 </a:rPr>
-                <a:t>. Accessed November 30, 2016. https://www.ers.usda.gov/data-products/county-level-data-sets/download-data.aspx</a:t>
+                <a:t>. Accessed November 30, 2016. https://www.ers.usda.gov/data-products/county-level-data-sets/download-data.aspx.</a:t>
               </a:r>
-              <a:r>
-                <a:rPr lang="en-US" sz="1300" dirty="0" smtClean="0">
-                  <a:latin typeface="Arial" pitchFamily="34" charset="0"/>
-                  <a:cs typeface="Arial" pitchFamily="34" charset="0"/>
-                </a:rPr>
-                <a:t>.</a:t>
-              </a:r>
-              <a:endParaRPr lang="en-US" sz="1300" dirty="0" smtClean="0">
-                <a:latin typeface="Arial" pitchFamily="34" charset="0"/>
-                <a:cs typeface="Arial" pitchFamily="34" charset="0"/>
-              </a:endParaRPr>
             </a:p>
           </p:txBody>
         </p:sp>
@@ -5708,21 +5654,7 @@
                 <a:latin typeface="Arial" pitchFamily="34" charset="0"/>
                 <a:cs typeface="Arial" pitchFamily="34" charset="0"/>
               </a:rPr>
-              <a:t>The diversity index is calculated according to the following </a:t>
-            </a:r>
-            <a:r>
-              <a:rPr lang="en-US" sz="3200" dirty="0" smtClean="0">
-                <a:latin typeface="Arial" pitchFamily="34" charset="0"/>
-                <a:cs typeface="Arial" pitchFamily="34" charset="0"/>
-              </a:rPr>
-              <a:t>formula [3], </a:t>
-            </a:r>
-            <a:r>
-              <a:rPr lang="en-US" sz="3200" dirty="0" smtClean="0">
-                <a:latin typeface="Arial" pitchFamily="34" charset="0"/>
-                <a:cs typeface="Arial" pitchFamily="34" charset="0"/>
-              </a:rPr>
-              <a:t>where </a:t>
+              <a:t>The diversity index is calculated according to the following formula [3], where </a:t>
             </a:r>
             <a:r>
               <a:rPr lang="en-US" sz="3200" i="1" dirty="0" err="1" smtClean="0">
@@ -6020,14 +5952,7 @@
                 <a:latin typeface="Arial" pitchFamily="34" charset="0"/>
                 <a:cs typeface="Arial" pitchFamily="34" charset="0"/>
               </a:rPr>
-              <a:t>Results</a:t>
-            </a:r>
-            <a:r>
-              <a:rPr lang="en-US" sz="3200" b="1" dirty="0" smtClean="0">
-                <a:latin typeface="Arial" pitchFamily="34" charset="0"/>
-                <a:cs typeface="Arial" pitchFamily="34" charset="0"/>
-              </a:rPr>
-              <a:t>:</a:t>
+              <a:t>Results:</a:t>
             </a:r>
           </a:p>
           <a:p>
@@ -6190,14 +6115,7 @@
                 <a:latin typeface="Arial" pitchFamily="34" charset="0"/>
                 <a:cs typeface="Arial" pitchFamily="34" charset="0"/>
               </a:rPr>
-              <a:t>Results and Interpretation</a:t>
-            </a:r>
-            <a:r>
-              <a:rPr lang="en-US" sz="3200" b="1" dirty="0" smtClean="0">
-                <a:latin typeface="Arial" pitchFamily="34" charset="0"/>
-                <a:cs typeface="Arial" pitchFamily="34" charset="0"/>
-              </a:rPr>
-              <a:t>:</a:t>
+              <a:t>Results and Interpretation:</a:t>
             </a:r>
             <a:endParaRPr lang="en-US" sz="3200" b="1" dirty="0" smtClean="0">
               <a:solidFill>
@@ -6736,35 +6654,21 @@
                 <a:latin typeface="Arial" pitchFamily="34" charset="0"/>
                 <a:cs typeface="Arial" pitchFamily="34" charset="0"/>
               </a:rPr>
-              <a:t>Results and Interpretation</a:t>
-            </a:r>
+              <a:t>Results and Interpretation:</a:t>
+            </a:r>
+          </a:p>
+          <a:p>
+            <a:pPr marL="863600" lvl="1" indent="-406400">
+              <a:lnSpc>
+                <a:spcPts val="3700"/>
+              </a:lnSpc>
+            </a:pPr>
             <a:r>
               <a:rPr lang="en-US" sz="3200" b="1" dirty="0" smtClean="0">
                 <a:latin typeface="Arial" pitchFamily="34" charset="0"/>
                 <a:cs typeface="Arial" pitchFamily="34" charset="0"/>
               </a:rPr>
-              <a:t>:</a:t>
-            </a:r>
-          </a:p>
-          <a:p>
-            <a:pPr marL="863600" lvl="1" indent="-406400">
-              <a:lnSpc>
-                <a:spcPts val="3700"/>
-              </a:lnSpc>
-            </a:pPr>
-            <a:r>
-              <a:rPr lang="en-US" sz="3200" b="1" dirty="0" smtClean="0">
-                <a:latin typeface="Arial" pitchFamily="34" charset="0"/>
-                <a:cs typeface="Arial" pitchFamily="34" charset="0"/>
-              </a:rPr>
-              <a:t>	</a:t>
-            </a:r>
-            <a:r>
-              <a:rPr lang="en-US" sz="3200" b="1" dirty="0" smtClean="0">
-                <a:latin typeface="Arial" pitchFamily="34" charset="0"/>
-                <a:cs typeface="Arial" pitchFamily="34" charset="0"/>
-              </a:rPr>
-              <a:t>*</a:t>
+              <a:t>	*</a:t>
             </a:r>
             <a:r>
               <a:rPr lang="en-US" sz="3200" dirty="0" smtClean="0">
@@ -6920,35 +6824,21 @@
                 <a:latin typeface="Arial" pitchFamily="34" charset="0"/>
                 <a:cs typeface="Arial" pitchFamily="34" charset="0"/>
               </a:rPr>
-              <a:t> </a:t>
-            </a:r>
+              <a:t>       does in counties with different diversity indices)</a:t>
+            </a:r>
+          </a:p>
+          <a:p>
+            <a:pPr marL="971550" lvl="1" indent="-514350">
+              <a:lnSpc>
+                <a:spcPts val="3700"/>
+              </a:lnSpc>
+            </a:pPr>
             <a:r>
               <a:rPr lang="en-US" sz="3200" dirty="0" smtClean="0">
                 <a:latin typeface="Arial" pitchFamily="34" charset="0"/>
                 <a:cs typeface="Arial" pitchFamily="34" charset="0"/>
               </a:rPr>
-              <a:t>      does in counties with different diversity indices)</a:t>
-            </a:r>
-          </a:p>
-          <a:p>
-            <a:pPr marL="971550" lvl="1" indent="-514350">
-              <a:lnSpc>
-                <a:spcPts val="3700"/>
-              </a:lnSpc>
-            </a:pPr>
-            <a:r>
-              <a:rPr lang="en-US" sz="3200" dirty="0" smtClean="0">
-                <a:latin typeface="Arial" pitchFamily="34" charset="0"/>
-                <a:cs typeface="Arial" pitchFamily="34" charset="0"/>
-              </a:rPr>
-              <a:t> </a:t>
-            </a:r>
-            <a:r>
-              <a:rPr lang="en-US" sz="3200" dirty="0" smtClean="0">
-                <a:latin typeface="Arial" pitchFamily="34" charset="0"/>
-                <a:cs typeface="Arial" pitchFamily="34" charset="0"/>
-              </a:rPr>
-              <a:t>    - Could also look at data in reverse order (of people with high income, are they generally from counties with higher or lower diversity)</a:t>
+              <a:t>     - Could also look at data in reverse order (of people with high income, are they generally from counties with higher or lower diversity)</a:t>
             </a:r>
           </a:p>
         </p:txBody>
@@ -7418,19 +7308,8 @@
                 <a:latin typeface="Arial" pitchFamily="34" charset="0"/>
                 <a:cs typeface="Arial" pitchFamily="34" charset="0"/>
               </a:rPr>
-              <a:t>Here, we look for correlations between county diversity and </a:t>
-            </a:r>
-            <a:r>
-              <a:rPr lang="en-US" sz="3200" dirty="0" smtClean="0">
-                <a:latin typeface="Arial" pitchFamily="34" charset="0"/>
-                <a:cs typeface="Arial" pitchFamily="34" charset="0"/>
-              </a:rPr>
-              <a:t>economic outcomes</a:t>
-            </a:r>
-            <a:endParaRPr lang="en-US" sz="3200" dirty="0" smtClean="0">
-              <a:latin typeface="Arial" pitchFamily="34" charset="0"/>
-              <a:cs typeface="Arial" pitchFamily="34" charset="0"/>
-            </a:endParaRPr>
+              <a:t>Here, we look for correlations between county diversity and economic outcomes</a:t>
+            </a:r>
           </a:p>
           <a:p>
             <a:pPr marL="863600" lvl="1" indent="-406400">
@@ -7534,21 +7413,7 @@
                 <a:latin typeface="Arial" pitchFamily="34" charset="0"/>
                 <a:cs typeface="Arial" pitchFamily="34" charset="0"/>
               </a:rPr>
-              <a:t>Results </a:t>
-            </a:r>
-            <a:r>
-              <a:rPr lang="en-US" sz="3200" b="1" dirty="0" smtClean="0">
-                <a:latin typeface="Arial" pitchFamily="34" charset="0"/>
-                <a:cs typeface="Arial" pitchFamily="34" charset="0"/>
-              </a:rPr>
-              <a:t>and Interpretation</a:t>
-            </a:r>
-            <a:r>
-              <a:rPr lang="en-US" sz="3200" b="1" dirty="0" smtClean="0">
-                <a:latin typeface="Arial" pitchFamily="34" charset="0"/>
-                <a:cs typeface="Arial" pitchFamily="34" charset="0"/>
-              </a:rPr>
-              <a:t>:</a:t>
+              <a:t>Results and Interpretation:</a:t>
             </a:r>
           </a:p>
           <a:p>
@@ -7963,10 +7828,6 @@
               </a:rPr>
               <a:t>North, Midwest, and Central USA among less diverse regions</a:t>
             </a:r>
-            <a:endParaRPr lang="en-US" sz="3200" dirty="0" smtClean="0">
-              <a:latin typeface="Arial" pitchFamily="34" charset="0"/>
-              <a:cs typeface="Arial" pitchFamily="34" charset="0"/>
-            </a:endParaRPr>
           </a:p>
         </p:txBody>
       </p:sp>
@@ -8078,10 +7939,6 @@
               </a:rPr>
               <a:t>In intermediate diversity levels, possibly minority groups marginalized leading to higher poverty rates</a:t>
             </a:r>
-            <a:endParaRPr lang="en-US" sz="3200" dirty="0" smtClean="0">
-              <a:latin typeface="Arial" pitchFamily="34" charset="0"/>
-              <a:cs typeface="Arial" pitchFamily="34" charset="0"/>
-            </a:endParaRPr>
           </a:p>
           <a:p>
             <a:pPr marL="863600" lvl="1" indent="-406400">
@@ -8098,10 +7955,6 @@
               </a:rPr>
               <a:t>At very low diversity and at very high diversity, this phenomenon not observed</a:t>
             </a:r>
-            <a:endParaRPr lang="en-US" sz="3200" dirty="0" smtClean="0">
-              <a:latin typeface="Arial" pitchFamily="34" charset="0"/>
-              <a:cs typeface="Arial" pitchFamily="34" charset="0"/>
-            </a:endParaRPr>
           </a:p>
         </p:txBody>
       </p:sp>
@@ -8155,21 +8008,7 @@
                 <a:latin typeface="Arial" pitchFamily="34" charset="0"/>
                 <a:cs typeface="Arial" pitchFamily="34" charset="0"/>
               </a:rPr>
-              <a:t>Higher diversity index is </a:t>
-            </a:r>
-            <a:r>
-              <a:rPr lang="en-US" sz="3200" dirty="0" smtClean="0">
-                <a:latin typeface="Arial" pitchFamily="34" charset="0"/>
-                <a:cs typeface="Arial" pitchFamily="34" charset="0"/>
-              </a:rPr>
-              <a:t>correlated </a:t>
-            </a:r>
-            <a:r>
-              <a:rPr lang="en-US" sz="3200" dirty="0" smtClean="0">
-                <a:latin typeface="Arial" pitchFamily="34" charset="0"/>
-                <a:cs typeface="Arial" pitchFamily="34" charset="0"/>
-              </a:rPr>
-              <a:t>with a higher income gap</a:t>
+              <a:t>Higher diversity index is correlated with a higher income gap</a:t>
             </a:r>
           </a:p>
           <a:p>
@@ -8549,10 +8388,6 @@
               </a:rPr>
               <a:t>Variations in County-Level Life Expectancy as Result of Diversity </a:t>
             </a:r>
-            <a:endParaRPr lang="en-US" sz="3200" i="1" u="sng" dirty="0" smtClean="0">
-              <a:latin typeface="Arial" pitchFamily="34" charset="0"/>
-              <a:cs typeface="Arial" pitchFamily="34" charset="0"/>
-            </a:endParaRPr>
           </a:p>
         </p:txBody>
       </p:sp>
@@ -8641,35 +8476,21 @@
                 <a:latin typeface="Arial" pitchFamily="34" charset="0"/>
                 <a:cs typeface="Arial" pitchFamily="34" charset="0"/>
               </a:rPr>
-              <a:t> </a:t>
-            </a:r>
+              <a:t>    - Possibly correlated with higher poverty levels </a:t>
+            </a:r>
+          </a:p>
+          <a:p>
+            <a:pPr marL="863600" lvl="1" indent="-406400">
+              <a:lnSpc>
+                <a:spcPts val="3700"/>
+              </a:lnSpc>
+            </a:pPr>
             <a:r>
               <a:rPr lang="en-US" sz="3200" dirty="0" smtClean="0">
                 <a:latin typeface="Arial" pitchFamily="34" charset="0"/>
                 <a:cs typeface="Arial" pitchFamily="34" charset="0"/>
               </a:rPr>
-              <a:t>   - Possibly correlated with higher poverty levels </a:t>
-            </a:r>
-          </a:p>
-          <a:p>
-            <a:pPr marL="863600" lvl="1" indent="-406400">
-              <a:lnSpc>
-                <a:spcPts val="3700"/>
-              </a:lnSpc>
-            </a:pPr>
-            <a:r>
-              <a:rPr lang="en-US" sz="3200" dirty="0" smtClean="0">
-                <a:latin typeface="Arial" pitchFamily="34" charset="0"/>
-                <a:cs typeface="Arial" pitchFamily="34" charset="0"/>
-              </a:rPr>
-              <a:t> </a:t>
-            </a:r>
-            <a:r>
-              <a:rPr lang="en-US" sz="3200" dirty="0" smtClean="0">
-                <a:latin typeface="Arial" pitchFamily="34" charset="0"/>
-                <a:cs typeface="Arial" pitchFamily="34" charset="0"/>
-              </a:rPr>
-              <a:t>     </a:t>
+              <a:t>      </a:t>
             </a:r>
             <a:r>
               <a:rPr lang="en-US" sz="3200" dirty="0" smtClean="0">
@@ -8692,15 +8513,22 @@
                 <a:cs typeface="Arial" pitchFamily="34" charset="0"/>
                 <a:sym typeface="Wingdings" pitchFamily="2" charset="2"/>
               </a:rPr>
-              <a:t> </a:t>
-            </a:r>
+              <a:t>    - More data necessary to discern whether </a:t>
+            </a:r>
+          </a:p>
+          <a:p>
+            <a:pPr marL="863600" lvl="1" indent="-406400">
+              <a:lnSpc>
+                <a:spcPts val="3700"/>
+              </a:lnSpc>
+            </a:pPr>
             <a:r>
               <a:rPr lang="en-US" sz="3200" dirty="0" smtClean="0">
                 <a:latin typeface="Arial" pitchFamily="34" charset="0"/>
                 <a:cs typeface="Arial" pitchFamily="34" charset="0"/>
                 <a:sym typeface="Wingdings" pitchFamily="2" charset="2"/>
               </a:rPr>
-              <a:t>   - More data necessary to discern whether </a:t>
+              <a:t>	   effect is caused by diversity or just </a:t>
             </a:r>
           </a:p>
           <a:p>
@@ -8715,38 +8543,7 @@
                 <a:cs typeface="Arial" pitchFamily="34" charset="0"/>
                 <a:sym typeface="Wingdings" pitchFamily="2" charset="2"/>
               </a:rPr>
-              <a:t>	</a:t>
-            </a:r>
-            <a:r>
-              <a:rPr lang="en-US" sz="3200" dirty="0" smtClean="0">
-                <a:latin typeface="Arial" pitchFamily="34" charset="0"/>
-                <a:cs typeface="Arial" pitchFamily="34" charset="0"/>
-                <a:sym typeface="Wingdings" pitchFamily="2" charset="2"/>
-              </a:rPr>
-              <a:t>   effect is caused by diversity or just </a:t>
-            </a:r>
-          </a:p>
-          <a:p>
-            <a:pPr marL="863600" lvl="1" indent="-406400">
-              <a:lnSpc>
-                <a:spcPts val="3700"/>
-              </a:lnSpc>
-            </a:pPr>
-            <a:r>
-              <a:rPr lang="en-US" sz="3200" dirty="0" smtClean="0">
-                <a:latin typeface="Arial" pitchFamily="34" charset="0"/>
-                <a:cs typeface="Arial" pitchFamily="34" charset="0"/>
-                <a:sym typeface="Wingdings" pitchFamily="2" charset="2"/>
-              </a:rPr>
-              <a:t> </a:t>
-            </a:r>
-            <a:r>
-              <a:rPr lang="en-US" sz="3200" dirty="0" smtClean="0">
-                <a:latin typeface="Arial" pitchFamily="34" charset="0"/>
-                <a:cs typeface="Arial" pitchFamily="34" charset="0"/>
-                <a:sym typeface="Wingdings" pitchFamily="2" charset="2"/>
-              </a:rPr>
-              <a:t>     correlated with it</a:t>
+              <a:t>      correlated with it</a:t>
             </a:r>
             <a:endParaRPr lang="en-US" sz="3200" dirty="0" smtClean="0">
               <a:latin typeface="Arial" pitchFamily="34" charset="0"/>
@@ -8819,14 +8616,7 @@
                 <a:latin typeface="Arial" pitchFamily="34" charset="0"/>
                 <a:cs typeface="Arial" pitchFamily="34" charset="0"/>
               </a:rPr>
-              <a:t>  </a:t>
-            </a:r>
-            <a:r>
-              <a:rPr lang="en-US" sz="3200" dirty="0" smtClean="0">
-                <a:latin typeface="Arial" pitchFamily="34" charset="0"/>
-                <a:cs typeface="Arial" pitchFamily="34" charset="0"/>
-              </a:rPr>
-              <a:t>  - More diverse counties urban </a:t>
+              <a:t>    - More diverse counties urban </a:t>
             </a:r>
             <a:r>
               <a:rPr lang="en-US" sz="3200" dirty="0" smtClean="0">
@@ -8849,15 +8639,22 @@
                 <a:cs typeface="Arial" pitchFamily="34" charset="0"/>
                 <a:sym typeface="Wingdings" pitchFamily="2" charset="2"/>
               </a:rPr>
-              <a:t> </a:t>
-            </a:r>
+              <a:t>       of disease</a:t>
+            </a:r>
+          </a:p>
+          <a:p>
+            <a:pPr marL="863600" lvl="1" indent="-406400">
+              <a:lnSpc>
+                <a:spcPts val="3700"/>
+              </a:lnSpc>
+            </a:pPr>
             <a:r>
               <a:rPr lang="en-US" sz="3200" dirty="0" smtClean="0">
                 <a:latin typeface="Arial" pitchFamily="34" charset="0"/>
                 <a:cs typeface="Arial" pitchFamily="34" charset="0"/>
                 <a:sym typeface="Wingdings" pitchFamily="2" charset="2"/>
               </a:rPr>
-              <a:t>      of disease</a:t>
+              <a:t>    - Certain racial groups have lower life </a:t>
             </a:r>
           </a:p>
           <a:p>
@@ -8872,69 +8669,22 @@
                 <a:cs typeface="Arial" pitchFamily="34" charset="0"/>
                 <a:sym typeface="Wingdings" pitchFamily="2" charset="2"/>
               </a:rPr>
-              <a:t> </a:t>
-            </a:r>
+              <a:t>       expectancies, driving down the number for</a:t>
+            </a:r>
+          </a:p>
+          <a:p>
+            <a:pPr marL="863600" lvl="1" indent="-406400">
+              <a:lnSpc>
+                <a:spcPts val="3700"/>
+              </a:lnSpc>
+            </a:pPr>
             <a:r>
               <a:rPr lang="en-US" sz="3200" dirty="0" smtClean="0">
                 <a:latin typeface="Arial" pitchFamily="34" charset="0"/>
                 <a:cs typeface="Arial" pitchFamily="34" charset="0"/>
                 <a:sym typeface="Wingdings" pitchFamily="2" charset="2"/>
               </a:rPr>
-              <a:t>   - Certain racial groups </a:t>
-            </a:r>
-            <a:r>
-              <a:rPr lang="en-US" sz="3200" dirty="0" smtClean="0">
-                <a:latin typeface="Arial" pitchFamily="34" charset="0"/>
-                <a:cs typeface="Arial" pitchFamily="34" charset="0"/>
-                <a:sym typeface="Wingdings" pitchFamily="2" charset="2"/>
-              </a:rPr>
-              <a:t>have lower life </a:t>
-            </a:r>
-          </a:p>
-          <a:p>
-            <a:pPr marL="863600" lvl="1" indent="-406400">
-              <a:lnSpc>
-                <a:spcPts val="3700"/>
-              </a:lnSpc>
-            </a:pPr>
-            <a:r>
-              <a:rPr lang="en-US" sz="3200" dirty="0" smtClean="0">
-                <a:latin typeface="Arial" pitchFamily="34" charset="0"/>
-                <a:cs typeface="Arial" pitchFamily="34" charset="0"/>
-                <a:sym typeface="Wingdings" pitchFamily="2" charset="2"/>
-              </a:rPr>
-              <a:t> </a:t>
-            </a:r>
-            <a:r>
-              <a:rPr lang="en-US" sz="3200" dirty="0" smtClean="0">
-                <a:latin typeface="Arial" pitchFamily="34" charset="0"/>
-                <a:cs typeface="Arial" pitchFamily="34" charset="0"/>
-                <a:sym typeface="Wingdings" pitchFamily="2" charset="2"/>
-              </a:rPr>
-              <a:t>      expectancies, driving down the number for</a:t>
-            </a:r>
-          </a:p>
-          <a:p>
-            <a:pPr marL="863600" lvl="1" indent="-406400">
-              <a:lnSpc>
-                <a:spcPts val="3700"/>
-              </a:lnSpc>
-            </a:pPr>
-            <a:r>
-              <a:rPr lang="en-US" sz="3200" dirty="0" smtClean="0">
-                <a:latin typeface="Arial" pitchFamily="34" charset="0"/>
-                <a:cs typeface="Arial" pitchFamily="34" charset="0"/>
-                <a:sym typeface="Wingdings" pitchFamily="2" charset="2"/>
-              </a:rPr>
-              <a:t> </a:t>
-            </a:r>
-            <a:r>
-              <a:rPr lang="en-US" sz="3200" dirty="0" smtClean="0">
-                <a:latin typeface="Arial" pitchFamily="34" charset="0"/>
-                <a:cs typeface="Arial" pitchFamily="34" charset="0"/>
-                <a:sym typeface="Wingdings" pitchFamily="2" charset="2"/>
-              </a:rPr>
-              <a:t>      those counties</a:t>
+              <a:t>       those counties</a:t>
             </a:r>
             <a:endParaRPr lang="en-US" sz="3200" dirty="0" smtClean="0">
               <a:latin typeface="Arial" pitchFamily="34" charset="0"/>

</xml_diff>